<commit_message>
fix typo on =
</commit_message>
<xml_diff>
--- a/1phase/data-stucts/HTC-nested-data-structures.pptx
+++ b/1phase/data-stucts/HTC-nested-data-structures.pptx
@@ -250,7 +250,7 @@
           <a:p>
             <a:fld id="{CAA47771-BE1A-0F41-A2AB-502D986D5C71}" type="datetimeFigureOut">
               <a:rPr lang="en-US" smtClean="0"/>
-              <a:t>8/19/15</a:t>
+              <a:t>8/20/15</a:t>
             </a:fld>
             <a:endParaRPr lang="en-US"/>
           </a:p>
@@ -416,7 +416,7 @@
           <a:p>
             <a:fld id="{4083CDE4-3FA1-6A4B-862D-E61F193A4941}" type="datetimeFigureOut">
               <a:rPr lang="en-US" smtClean="0"/>
-              <a:t>8/19/15</a:t>
+              <a:t>8/20/15</a:t>
             </a:fld>
             <a:endParaRPr lang="en-US"/>
           </a:p>
@@ -2384,7 +2384,11 @@
           <a:p>
             <a:r>
               <a:rPr lang="en-US" dirty="0" smtClean="0"/>
-              <a:t>Method Chaining</a:t>
+              <a:t>Answer: Method </a:t>
+            </a:r>
+            <a:r>
+              <a:rPr lang="en-US" dirty="0" smtClean="0"/>
+              <a:t>Chaining</a:t>
             </a:r>
             <a:endParaRPr lang="en-US" dirty="0"/>
           </a:p>
@@ -7977,7 +7981,19 @@
           <a:p>
             <a:r>
               <a:rPr lang="en-US" dirty="0" smtClean="0"/>
-              <a:t>Why we care.</a:t>
+              <a:t>Why </a:t>
+            </a:r>
+            <a:r>
+              <a:rPr lang="en-US" dirty="0" smtClean="0"/>
+              <a:t>you</a:t>
+            </a:r>
+            <a:r>
+              <a:rPr lang="en-US" dirty="0" smtClean="0"/>
+              <a:t> </a:t>
+            </a:r>
+            <a:r>
+              <a:rPr lang="en-US" dirty="0" smtClean="0"/>
+              <a:t>care.</a:t>
             </a:r>
             <a:endParaRPr lang="en-US" dirty="0"/>
           </a:p>
@@ -14930,7 +14946,19 @@
             </a:r>
             <a:r>
               <a:rPr lang="en-US" dirty="0" smtClean="0"/>
-              <a:t> { |player| player[1] = “Sally </a:t>
+              <a:t> { |player| player[1</a:t>
+            </a:r>
+            <a:r>
+              <a:rPr lang="en-US" smtClean="0"/>
+              <a:t>] </a:t>
+            </a:r>
+            <a:r>
+              <a:rPr lang="en-US" smtClean="0"/>
+              <a:t>== </a:t>
+            </a:r>
+            <a:r>
+              <a:rPr lang="en-US" dirty="0" smtClean="0"/>
+              <a:t>“Sally </a:t>
             </a:r>
             <a:r>
               <a:rPr lang="en-US" dirty="0" err="1" smtClean="0"/>

</xml_diff>

<commit_message>
split stucts to 3 files
</commit_message>
<xml_diff>
--- a/1phase/data-stucts/HTC-nested-data-structures.pptx
+++ b/1phase/data-stucts/HTC-nested-data-structures.pptx
@@ -5,10 +5,10 @@
     <p:sldMasterId id="2147483660" r:id="rId1"/>
   </p:sldMasterIdLst>
   <p:notesMasterIdLst>
-    <p:notesMasterId r:id="rId58"/>
+    <p:notesMasterId r:id="rId57"/>
   </p:notesMasterIdLst>
   <p:handoutMasterIdLst>
-    <p:handoutMasterId r:id="rId59"/>
+    <p:handoutMasterId r:id="rId58"/>
   </p:handoutMasterIdLst>
   <p:sldIdLst>
     <p:sldId id="256" r:id="rId2"/>
@@ -50,23 +50,22 @@
     <p:sldId id="309" r:id="rId38"/>
     <p:sldId id="310" r:id="rId39"/>
     <p:sldId id="335" r:id="rId40"/>
-    <p:sldId id="311" r:id="rId41"/>
-    <p:sldId id="312" r:id="rId42"/>
-    <p:sldId id="287" r:id="rId43"/>
-    <p:sldId id="289" r:id="rId44"/>
-    <p:sldId id="288" r:id="rId45"/>
-    <p:sldId id="290" r:id="rId46"/>
-    <p:sldId id="291" r:id="rId47"/>
-    <p:sldId id="295" r:id="rId48"/>
-    <p:sldId id="331" r:id="rId49"/>
-    <p:sldId id="332" r:id="rId50"/>
-    <p:sldId id="333" r:id="rId51"/>
-    <p:sldId id="296" r:id="rId52"/>
-    <p:sldId id="298" r:id="rId53"/>
-    <p:sldId id="297" r:id="rId54"/>
-    <p:sldId id="300" r:id="rId55"/>
-    <p:sldId id="342" r:id="rId56"/>
-    <p:sldId id="341" r:id="rId57"/>
+    <p:sldId id="312" r:id="rId41"/>
+    <p:sldId id="287" r:id="rId42"/>
+    <p:sldId id="289" r:id="rId43"/>
+    <p:sldId id="288" r:id="rId44"/>
+    <p:sldId id="290" r:id="rId45"/>
+    <p:sldId id="291" r:id="rId46"/>
+    <p:sldId id="295" r:id="rId47"/>
+    <p:sldId id="331" r:id="rId48"/>
+    <p:sldId id="332" r:id="rId49"/>
+    <p:sldId id="333" r:id="rId50"/>
+    <p:sldId id="296" r:id="rId51"/>
+    <p:sldId id="298" r:id="rId52"/>
+    <p:sldId id="297" r:id="rId53"/>
+    <p:sldId id="300" r:id="rId54"/>
+    <p:sldId id="342" r:id="rId55"/>
+    <p:sldId id="341" r:id="rId56"/>
   </p:sldIdLst>
   <p:sldSz cx="9144000" cy="6858000" type="screen4x3"/>
   <p:notesSz cx="6858000" cy="9144000"/>
@@ -10643,11 +10642,7 @@
           <a:p>
             <a:r>
               <a:rPr lang="en-US" dirty="0" smtClean="0"/>
-              <a:t>Finally </a:t>
-            </a:r>
-            <a:r>
-              <a:rPr lang="en-US" smtClean="0"/>
-              <a:t>manipulate the input</a:t>
+              <a:t>Finally manipulate the input</a:t>
             </a:r>
             <a:endParaRPr lang="en-US" dirty="0"/>
           </a:p>
@@ -12044,8 +12039,9 @@
           <a:p>
             <a:r>
               <a:rPr lang="en-US" dirty="0" smtClean="0"/>
-              <a:t>Manipulate the input</a:t>
-            </a:r>
+              <a:t>Refactor code for clarity </a:t>
+            </a:r>
+            <a:endParaRPr lang="en-US" dirty="0" smtClean="0"/>
           </a:p>
           <a:p>
             <a:pPr marL="0" indent="0">
@@ -12078,10 +12074,221 @@
           </a:p>
         </p:txBody>
       </p:sp>
+      <p:sp>
+        <p:nvSpPr>
+          <p:cNvPr id="8" name="Content Placeholder 2"/>
+          <p:cNvSpPr txBox="1">
+            <a:spLocks/>
+          </p:cNvSpPr>
+          <p:nvPr/>
+        </p:nvSpPr>
+        <p:spPr>
+          <a:xfrm>
+            <a:off x="457200" y="2981540"/>
+            <a:ext cx="8229600" cy="2758860"/>
+          </a:xfrm>
+          <a:prstGeom prst="rect">
+            <a:avLst/>
+          </a:prstGeom>
+        </p:spPr>
+        <p:txBody>
+          <a:bodyPr vert="horz" lIns="91440" tIns="45720" rIns="91440" bIns="45720" rtlCol="0">
+            <a:normAutofit/>
+          </a:bodyPr>
+          <a:lstStyle>
+            <a:lvl1pPr marL="342900" indent="-342900" algn="l" defTabSz="457200" rtl="0" eaLnBrk="1" latinLnBrk="0" hangingPunct="1">
+              <a:spcBef>
+                <a:spcPct val="20000"/>
+              </a:spcBef>
+              <a:buFont typeface="Arial"/>
+              <a:buChar char="•"/>
+              <a:defRPr sz="3200" kern="1200">
+                <a:solidFill>
+                  <a:schemeClr val="accent2"/>
+                </a:solidFill>
+                <a:latin typeface="+mn-lt"/>
+                <a:ea typeface="+mn-ea"/>
+                <a:cs typeface="+mn-cs"/>
+              </a:defRPr>
+            </a:lvl1pPr>
+            <a:lvl2pPr marL="742950" indent="-285750" algn="l" defTabSz="457200" rtl="0" eaLnBrk="1" latinLnBrk="0" hangingPunct="1">
+              <a:spcBef>
+                <a:spcPct val="20000"/>
+              </a:spcBef>
+              <a:buFont typeface="Arial"/>
+              <a:buChar char="•"/>
+              <a:defRPr sz="2800" kern="1200">
+                <a:solidFill>
+                  <a:schemeClr val="accent3"/>
+                </a:solidFill>
+                <a:latin typeface="+mn-lt"/>
+                <a:ea typeface="+mn-ea"/>
+                <a:cs typeface="+mn-cs"/>
+              </a:defRPr>
+            </a:lvl2pPr>
+            <a:lvl3pPr marL="1143000" indent="-228600" algn="l" defTabSz="457200" rtl="0" eaLnBrk="1" latinLnBrk="0" hangingPunct="1">
+              <a:spcBef>
+                <a:spcPct val="20000"/>
+              </a:spcBef>
+              <a:buFont typeface="Arial"/>
+              <a:buChar char="•"/>
+              <a:defRPr sz="2400" kern="1200">
+                <a:solidFill>
+                  <a:schemeClr val="accent3"/>
+                </a:solidFill>
+                <a:latin typeface="+mn-lt"/>
+                <a:ea typeface="+mn-ea"/>
+                <a:cs typeface="+mn-cs"/>
+              </a:defRPr>
+            </a:lvl3pPr>
+            <a:lvl4pPr marL="1600200" indent="-228600" algn="l" defTabSz="457200" rtl="0" eaLnBrk="1" latinLnBrk="0" hangingPunct="1">
+              <a:spcBef>
+                <a:spcPct val="20000"/>
+              </a:spcBef>
+              <a:buFont typeface="Arial"/>
+              <a:buChar char="•"/>
+              <a:defRPr sz="2000" kern="1200">
+                <a:solidFill>
+                  <a:schemeClr val="accent3"/>
+                </a:solidFill>
+                <a:latin typeface="+mn-lt"/>
+                <a:ea typeface="+mn-ea"/>
+                <a:cs typeface="+mn-cs"/>
+              </a:defRPr>
+            </a:lvl4pPr>
+            <a:lvl5pPr marL="2057400" indent="-228600" algn="l" defTabSz="457200" rtl="0" eaLnBrk="1" latinLnBrk="0" hangingPunct="1">
+              <a:spcBef>
+                <a:spcPct val="20000"/>
+              </a:spcBef>
+              <a:buFont typeface="Arial"/>
+              <a:buChar char="•"/>
+              <a:defRPr sz="2000" kern="1200">
+                <a:solidFill>
+                  <a:schemeClr val="accent3"/>
+                </a:solidFill>
+                <a:latin typeface="+mn-lt"/>
+                <a:ea typeface="+mn-ea"/>
+                <a:cs typeface="+mn-cs"/>
+              </a:defRPr>
+            </a:lvl5pPr>
+            <a:lvl6pPr marL="2514600" indent="-228600" algn="l" defTabSz="457200" rtl="0" eaLnBrk="1" latinLnBrk="0" hangingPunct="1">
+              <a:spcBef>
+                <a:spcPct val="20000"/>
+              </a:spcBef>
+              <a:buFont typeface="Arial"/>
+              <a:buChar char="•"/>
+              <a:defRPr sz="2000" kern="1200">
+                <a:solidFill>
+                  <a:schemeClr val="tx1"/>
+                </a:solidFill>
+                <a:latin typeface="+mn-lt"/>
+                <a:ea typeface="+mn-ea"/>
+                <a:cs typeface="+mn-cs"/>
+              </a:defRPr>
+            </a:lvl6pPr>
+            <a:lvl7pPr marL="2971800" indent="-228600" algn="l" defTabSz="457200" rtl="0" eaLnBrk="1" latinLnBrk="0" hangingPunct="1">
+              <a:spcBef>
+                <a:spcPct val="20000"/>
+              </a:spcBef>
+              <a:buFont typeface="Arial"/>
+              <a:buChar char="•"/>
+              <a:defRPr sz="2000" kern="1200">
+                <a:solidFill>
+                  <a:schemeClr val="tx1"/>
+                </a:solidFill>
+                <a:latin typeface="+mn-lt"/>
+                <a:ea typeface="+mn-ea"/>
+                <a:cs typeface="+mn-cs"/>
+              </a:defRPr>
+            </a:lvl7pPr>
+            <a:lvl8pPr marL="3429000" indent="-228600" algn="l" defTabSz="457200" rtl="0" eaLnBrk="1" latinLnBrk="0" hangingPunct="1">
+              <a:spcBef>
+                <a:spcPct val="20000"/>
+              </a:spcBef>
+              <a:buFont typeface="Arial"/>
+              <a:buChar char="•"/>
+              <a:defRPr sz="2000" kern="1200">
+                <a:solidFill>
+                  <a:schemeClr val="tx1"/>
+                </a:solidFill>
+                <a:latin typeface="+mn-lt"/>
+                <a:ea typeface="+mn-ea"/>
+                <a:cs typeface="+mn-cs"/>
+              </a:defRPr>
+            </a:lvl8pPr>
+            <a:lvl9pPr marL="3886200" indent="-228600" algn="l" defTabSz="457200" rtl="0" eaLnBrk="1" latinLnBrk="0" hangingPunct="1">
+              <a:spcBef>
+                <a:spcPct val="20000"/>
+              </a:spcBef>
+              <a:buFont typeface="Arial"/>
+              <a:buChar char="•"/>
+              <a:defRPr sz="2000" kern="1200">
+                <a:solidFill>
+                  <a:schemeClr val="tx1"/>
+                </a:solidFill>
+                <a:latin typeface="+mn-lt"/>
+                <a:ea typeface="+mn-ea"/>
+                <a:cs typeface="+mn-cs"/>
+              </a:defRPr>
+            </a:lvl9pPr>
+          </a:lstStyle>
+          <a:p>
+            <a:pPr marL="0" indent="0">
+              <a:buNone/>
+            </a:pPr>
+            <a:r>
+              <a:rPr lang="en-US" sz="1500" dirty="0" smtClean="0">
+                <a:latin typeface="Andale Mono"/>
+                <a:cs typeface="Andale Mono"/>
+              </a:rPr>
+              <a:t>desired = </a:t>
+            </a:r>
+            <a:r>
+              <a:rPr lang="en-US" sz="1600" dirty="0" err="1" smtClean="0">
+                <a:latin typeface="Andale Mono"/>
+                <a:cs typeface="Andale Mono"/>
+              </a:rPr>
+              <a:t>provided.map</a:t>
+            </a:r>
+            <a:r>
+              <a:rPr lang="en-US" sz="1500" dirty="0" smtClean="0">
+                <a:latin typeface="Andale Mono"/>
+                <a:cs typeface="Andale Mono"/>
+              </a:rPr>
+              <a:t>(&amp;:sample).</a:t>
+            </a:r>
+            <a:r>
+              <a:rPr lang="en-US" sz="1500" dirty="0" err="1" smtClean="0">
+                <a:latin typeface="Andale Mono"/>
+                <a:cs typeface="Andale Mono"/>
+              </a:rPr>
+              <a:t>each_slice</a:t>
+            </a:r>
+            <a:r>
+              <a:rPr lang="en-US" sz="1500" dirty="0" smtClean="0">
+                <a:latin typeface="Andale Mono"/>
+                <a:cs typeface="Andale Mono"/>
+              </a:rPr>
+              <a:t>(3).</a:t>
+            </a:r>
+            <a:r>
+              <a:rPr lang="en-US" sz="1500" dirty="0" err="1" smtClean="0">
+                <a:latin typeface="Andale Mono"/>
+                <a:cs typeface="Andale Mono"/>
+              </a:rPr>
+              <a:t>to_a</a:t>
+            </a:r>
+            <a:endParaRPr lang="en-US" sz="1500" dirty="0" smtClean="0">
+              <a:latin typeface="Andale Mono"/>
+              <a:cs typeface="Andale Mono"/>
+            </a:endParaRPr>
+          </a:p>
+        </p:txBody>
+      </p:sp>
     </p:spTree>
     <p:extLst>
       <p:ext uri="{BB962C8B-B14F-4D97-AF65-F5344CB8AC3E}">
-        <p14:creationId xmlns:p14="http://schemas.microsoft.com/office/powerpoint/2010/main" val="3716967962"/>
+        <p14:creationId xmlns:p14="http://schemas.microsoft.com/office/powerpoint/2010/main" val="624787831"/>
       </p:ext>
     </p:extLst>
   </p:cSld>
@@ -12132,7 +12339,7 @@
           <a:p>
             <a:r>
               <a:rPr lang="en-US" dirty="0" smtClean="0"/>
-              <a:t>Creating the Structure</a:t>
+              <a:t>Ambiguity in Complex Arrays</a:t>
             </a:r>
             <a:endParaRPr lang="en-US" dirty="0"/>
           </a:p>
@@ -12140,7 +12347,7 @@
       </p:sp>
       <p:sp>
         <p:nvSpPr>
-          <p:cNvPr id="7" name="Content Placeholder 6"/>
+          <p:cNvPr id="3" name="Content Placeholder 2"/>
           <p:cNvSpPr>
             <a:spLocks noGrp="1"/>
           </p:cNvSpPr>
@@ -12148,32 +12355,33 @@
             <p:ph idx="1"/>
           </p:nvPr>
         </p:nvSpPr>
-        <p:spPr>
-          <a:xfrm>
-            <a:off x="457200" y="1862668"/>
-            <a:ext cx="8229600" cy="1118872"/>
-          </a:xfrm>
-        </p:spPr>
+        <p:spPr/>
         <p:txBody>
           <a:bodyPr/>
           <a:lstStyle/>
           <a:p>
             <a:r>
               <a:rPr lang="en-US" dirty="0" smtClean="0"/>
-              <a:t>Manipulate the input</a:t>
-            </a:r>
-          </a:p>
-          <a:p>
-            <a:pPr marL="0" indent="0">
-              <a:buNone/>
-            </a:pPr>
-            <a:endParaRPr lang="en-US" dirty="0"/>
-          </a:p>
-        </p:txBody>
-      </p:sp>
-      <p:sp>
-        <p:nvSpPr>
-          <p:cNvPr id="5" name="Footer Placeholder 4"/>
+              <a:t>How do</a:t>
+            </a:r>
+            <a:r>
+              <a:rPr lang="en-US" baseline="0" dirty="0" smtClean="0"/>
+              <a:t> you</a:t>
+            </a:r>
+            <a:r>
+              <a:rPr lang="en-US" dirty="0" smtClean="0"/>
+              <a:t> access</a:t>
+            </a:r>
+            <a:r>
+              <a:rPr lang="en-US" baseline="0" dirty="0" smtClean="0"/>
+              <a:t> elements in an array?</a:t>
+            </a:r>
+          </a:p>
+        </p:txBody>
+      </p:sp>
+      <p:sp>
+        <p:nvSpPr>
+          <p:cNvPr id="4" name="Footer Placeholder 3"/>
           <p:cNvSpPr>
             <a:spLocks noGrp="1"/>
           </p:cNvSpPr>
@@ -12194,221 +12402,10 @@
           </a:p>
         </p:txBody>
       </p:sp>
-      <p:sp>
-        <p:nvSpPr>
-          <p:cNvPr id="8" name="Content Placeholder 2"/>
-          <p:cNvSpPr txBox="1">
-            <a:spLocks/>
-          </p:cNvSpPr>
-          <p:nvPr/>
-        </p:nvSpPr>
-        <p:spPr>
-          <a:xfrm>
-            <a:off x="457200" y="2981540"/>
-            <a:ext cx="8229600" cy="2758860"/>
-          </a:xfrm>
-          <a:prstGeom prst="rect">
-            <a:avLst/>
-          </a:prstGeom>
-        </p:spPr>
-        <p:txBody>
-          <a:bodyPr vert="horz" lIns="91440" tIns="45720" rIns="91440" bIns="45720" rtlCol="0">
-            <a:normAutofit/>
-          </a:bodyPr>
-          <a:lstStyle>
-            <a:lvl1pPr marL="342900" indent="-342900" algn="l" defTabSz="457200" rtl="0" eaLnBrk="1" latinLnBrk="0" hangingPunct="1">
-              <a:spcBef>
-                <a:spcPct val="20000"/>
-              </a:spcBef>
-              <a:buFont typeface="Arial"/>
-              <a:buChar char="•"/>
-              <a:defRPr sz="3200" kern="1200">
-                <a:solidFill>
-                  <a:schemeClr val="accent2"/>
-                </a:solidFill>
-                <a:latin typeface="+mn-lt"/>
-                <a:ea typeface="+mn-ea"/>
-                <a:cs typeface="+mn-cs"/>
-              </a:defRPr>
-            </a:lvl1pPr>
-            <a:lvl2pPr marL="742950" indent="-285750" algn="l" defTabSz="457200" rtl="0" eaLnBrk="1" latinLnBrk="0" hangingPunct="1">
-              <a:spcBef>
-                <a:spcPct val="20000"/>
-              </a:spcBef>
-              <a:buFont typeface="Arial"/>
-              <a:buChar char="•"/>
-              <a:defRPr sz="2800" kern="1200">
-                <a:solidFill>
-                  <a:schemeClr val="accent3"/>
-                </a:solidFill>
-                <a:latin typeface="+mn-lt"/>
-                <a:ea typeface="+mn-ea"/>
-                <a:cs typeface="+mn-cs"/>
-              </a:defRPr>
-            </a:lvl2pPr>
-            <a:lvl3pPr marL="1143000" indent="-228600" algn="l" defTabSz="457200" rtl="0" eaLnBrk="1" latinLnBrk="0" hangingPunct="1">
-              <a:spcBef>
-                <a:spcPct val="20000"/>
-              </a:spcBef>
-              <a:buFont typeface="Arial"/>
-              <a:buChar char="•"/>
-              <a:defRPr sz="2400" kern="1200">
-                <a:solidFill>
-                  <a:schemeClr val="accent3"/>
-                </a:solidFill>
-                <a:latin typeface="+mn-lt"/>
-                <a:ea typeface="+mn-ea"/>
-                <a:cs typeface="+mn-cs"/>
-              </a:defRPr>
-            </a:lvl3pPr>
-            <a:lvl4pPr marL="1600200" indent="-228600" algn="l" defTabSz="457200" rtl="0" eaLnBrk="1" latinLnBrk="0" hangingPunct="1">
-              <a:spcBef>
-                <a:spcPct val="20000"/>
-              </a:spcBef>
-              <a:buFont typeface="Arial"/>
-              <a:buChar char="•"/>
-              <a:defRPr sz="2000" kern="1200">
-                <a:solidFill>
-                  <a:schemeClr val="accent3"/>
-                </a:solidFill>
-                <a:latin typeface="+mn-lt"/>
-                <a:ea typeface="+mn-ea"/>
-                <a:cs typeface="+mn-cs"/>
-              </a:defRPr>
-            </a:lvl4pPr>
-            <a:lvl5pPr marL="2057400" indent="-228600" algn="l" defTabSz="457200" rtl="0" eaLnBrk="1" latinLnBrk="0" hangingPunct="1">
-              <a:spcBef>
-                <a:spcPct val="20000"/>
-              </a:spcBef>
-              <a:buFont typeface="Arial"/>
-              <a:buChar char="•"/>
-              <a:defRPr sz="2000" kern="1200">
-                <a:solidFill>
-                  <a:schemeClr val="accent3"/>
-                </a:solidFill>
-                <a:latin typeface="+mn-lt"/>
-                <a:ea typeface="+mn-ea"/>
-                <a:cs typeface="+mn-cs"/>
-              </a:defRPr>
-            </a:lvl5pPr>
-            <a:lvl6pPr marL="2514600" indent="-228600" algn="l" defTabSz="457200" rtl="0" eaLnBrk="1" latinLnBrk="0" hangingPunct="1">
-              <a:spcBef>
-                <a:spcPct val="20000"/>
-              </a:spcBef>
-              <a:buFont typeface="Arial"/>
-              <a:buChar char="•"/>
-              <a:defRPr sz="2000" kern="1200">
-                <a:solidFill>
-                  <a:schemeClr val="tx1"/>
-                </a:solidFill>
-                <a:latin typeface="+mn-lt"/>
-                <a:ea typeface="+mn-ea"/>
-                <a:cs typeface="+mn-cs"/>
-              </a:defRPr>
-            </a:lvl6pPr>
-            <a:lvl7pPr marL="2971800" indent="-228600" algn="l" defTabSz="457200" rtl="0" eaLnBrk="1" latinLnBrk="0" hangingPunct="1">
-              <a:spcBef>
-                <a:spcPct val="20000"/>
-              </a:spcBef>
-              <a:buFont typeface="Arial"/>
-              <a:buChar char="•"/>
-              <a:defRPr sz="2000" kern="1200">
-                <a:solidFill>
-                  <a:schemeClr val="tx1"/>
-                </a:solidFill>
-                <a:latin typeface="+mn-lt"/>
-                <a:ea typeface="+mn-ea"/>
-                <a:cs typeface="+mn-cs"/>
-              </a:defRPr>
-            </a:lvl7pPr>
-            <a:lvl8pPr marL="3429000" indent="-228600" algn="l" defTabSz="457200" rtl="0" eaLnBrk="1" latinLnBrk="0" hangingPunct="1">
-              <a:spcBef>
-                <a:spcPct val="20000"/>
-              </a:spcBef>
-              <a:buFont typeface="Arial"/>
-              <a:buChar char="•"/>
-              <a:defRPr sz="2000" kern="1200">
-                <a:solidFill>
-                  <a:schemeClr val="tx1"/>
-                </a:solidFill>
-                <a:latin typeface="+mn-lt"/>
-                <a:ea typeface="+mn-ea"/>
-                <a:cs typeface="+mn-cs"/>
-              </a:defRPr>
-            </a:lvl8pPr>
-            <a:lvl9pPr marL="3886200" indent="-228600" algn="l" defTabSz="457200" rtl="0" eaLnBrk="1" latinLnBrk="0" hangingPunct="1">
-              <a:spcBef>
-                <a:spcPct val="20000"/>
-              </a:spcBef>
-              <a:buFont typeface="Arial"/>
-              <a:buChar char="•"/>
-              <a:defRPr sz="2000" kern="1200">
-                <a:solidFill>
-                  <a:schemeClr val="tx1"/>
-                </a:solidFill>
-                <a:latin typeface="+mn-lt"/>
-                <a:ea typeface="+mn-ea"/>
-                <a:cs typeface="+mn-cs"/>
-              </a:defRPr>
-            </a:lvl9pPr>
-          </a:lstStyle>
-          <a:p>
-            <a:pPr marL="0" indent="0">
-              <a:buNone/>
-            </a:pPr>
-            <a:r>
-              <a:rPr lang="en-US" sz="1500" dirty="0" smtClean="0">
-                <a:latin typeface="Andale Mono"/>
-                <a:cs typeface="Andale Mono"/>
-              </a:rPr>
-              <a:t>desired = </a:t>
-            </a:r>
-            <a:r>
-              <a:rPr lang="en-US" sz="1600" dirty="0" err="1" smtClean="0">
-                <a:latin typeface="Andale Mono"/>
-                <a:cs typeface="Andale Mono"/>
-              </a:rPr>
-              <a:t>provided.map</a:t>
-            </a:r>
-            <a:r>
-              <a:rPr lang="en-US" sz="1500" dirty="0" smtClean="0">
-                <a:latin typeface="Andale Mono"/>
-                <a:cs typeface="Andale Mono"/>
-              </a:rPr>
-              <a:t>(&amp;:sample).</a:t>
-            </a:r>
-            <a:r>
-              <a:rPr lang="en-US" sz="1500" dirty="0" err="1" smtClean="0">
-                <a:latin typeface="Andale Mono"/>
-                <a:cs typeface="Andale Mono"/>
-              </a:rPr>
-              <a:t>each_slice</a:t>
-            </a:r>
-            <a:r>
-              <a:rPr lang="en-US" sz="1500" dirty="0" smtClean="0">
-                <a:latin typeface="Andale Mono"/>
-                <a:cs typeface="Andale Mono"/>
-              </a:rPr>
-              <a:t>(3).</a:t>
-            </a:r>
-            <a:r>
-              <a:rPr lang="en-US" sz="1500" dirty="0" err="1" smtClean="0">
-                <a:latin typeface="Andale Mono"/>
-                <a:cs typeface="Andale Mono"/>
-              </a:rPr>
-              <a:t>to_a</a:t>
-            </a:r>
-            <a:endParaRPr lang="en-US" sz="1500" dirty="0" smtClean="0">
-              <a:latin typeface="Andale Mono"/>
-              <a:cs typeface="Andale Mono"/>
-            </a:endParaRPr>
-          </a:p>
-        </p:txBody>
-      </p:sp>
     </p:spTree>
     <p:extLst>
       <p:ext uri="{BB962C8B-B14F-4D97-AF65-F5344CB8AC3E}">
-        <p14:creationId xmlns:p14="http://schemas.microsoft.com/office/powerpoint/2010/main" val="624787831"/>
+        <p14:creationId xmlns:p14="http://schemas.microsoft.com/office/powerpoint/2010/main" val="2585329328"/>
       </p:ext>
     </p:extLst>
   </p:cSld>
@@ -12497,6 +12494,25 @@
               <a:t> elements in an array?</a:t>
             </a:r>
           </a:p>
+          <a:p>
+            <a:pPr marL="0" indent="0">
+              <a:buNone/>
+            </a:pPr>
+            <a:endParaRPr lang="en-US" baseline="0" dirty="0" smtClean="0"/>
+          </a:p>
+          <a:p>
+            <a:pPr marL="0" indent="0" algn="ctr">
+              <a:buNone/>
+            </a:pPr>
+            <a:r>
+              <a:rPr lang="en-US" baseline="0" dirty="0" smtClean="0">
+                <a:solidFill>
+                  <a:schemeClr val="accent3"/>
+                </a:solidFill>
+              </a:rPr>
+              <a:t>by index</a:t>
+            </a:r>
+          </a:p>
         </p:txBody>
       </p:sp>
       <p:sp>
@@ -12525,7 +12541,7 @@
     </p:spTree>
     <p:extLst>
       <p:ext uri="{BB962C8B-B14F-4D97-AF65-F5344CB8AC3E}">
-        <p14:creationId xmlns:p14="http://schemas.microsoft.com/office/powerpoint/2010/main" val="2585329328"/>
+        <p14:creationId xmlns:p14="http://schemas.microsoft.com/office/powerpoint/2010/main" val="3414689164"/>
       </p:ext>
     </p:extLst>
   </p:cSld>
@@ -12599,147 +12615,19 @@
           <a:p>
             <a:r>
               <a:rPr lang="en-US" dirty="0" smtClean="0"/>
-              <a:t>How do</a:t>
+              <a:t>Indexes </a:t>
+            </a:r>
+            <a:r>
+              <a:rPr lang="en-US" dirty="0" smtClean="0"/>
+              <a:t>are</a:t>
             </a:r>
             <a:r>
               <a:rPr lang="en-US" baseline="0" dirty="0" smtClean="0"/>
-              <a:t> you</a:t>
-            </a:r>
-            <a:r>
-              <a:rPr lang="en-US" dirty="0" smtClean="0"/>
-              <a:t> access</a:t>
+              <a:t> </a:t>
             </a:r>
             <a:r>
               <a:rPr lang="en-US" baseline="0" dirty="0" smtClean="0"/>
-              <a:t> elements in an array?</a:t>
-            </a:r>
-          </a:p>
-          <a:p>
-            <a:pPr marL="0" indent="0">
-              <a:buNone/>
-            </a:pPr>
-            <a:endParaRPr lang="en-US" baseline="0" dirty="0" smtClean="0"/>
-          </a:p>
-          <a:p>
-            <a:pPr marL="0" indent="0" algn="ctr">
-              <a:buNone/>
-            </a:pPr>
-            <a:r>
-              <a:rPr lang="en-US" baseline="0" dirty="0" smtClean="0">
-                <a:solidFill>
-                  <a:schemeClr val="accent3"/>
-                </a:solidFill>
-              </a:rPr>
-              <a:t>by index</a:t>
-            </a:r>
-          </a:p>
-        </p:txBody>
-      </p:sp>
-      <p:sp>
-        <p:nvSpPr>
-          <p:cNvPr id="4" name="Footer Placeholder 3"/>
-          <p:cNvSpPr>
-            <a:spLocks noGrp="1"/>
-          </p:cNvSpPr>
-          <p:nvPr>
-            <p:ph type="ftr" sz="quarter" idx="3"/>
-          </p:nvPr>
-        </p:nvSpPr>
-        <p:spPr/>
-        <p:txBody>
-          <a:bodyPr/>
-          <a:lstStyle/>
-          <a:p>
-            <a:r>
-              <a:rPr lang="en-US" smtClean="0"/>
-              <a:t>Nested Data Structures: Arrays and Hashes</a:t>
-            </a:r>
-            <a:endParaRPr lang="en-US" dirty="0"/>
-          </a:p>
-        </p:txBody>
-      </p:sp>
-    </p:spTree>
-    <p:extLst>
-      <p:ext uri="{BB962C8B-B14F-4D97-AF65-F5344CB8AC3E}">
-        <p14:creationId xmlns:p14="http://schemas.microsoft.com/office/powerpoint/2010/main" val="3414689164"/>
-      </p:ext>
-    </p:extLst>
-  </p:cSld>
-  <p:clrMapOvr>
-    <a:masterClrMapping/>
-  </p:clrMapOvr>
-  <p:timing>
-    <p:tnLst>
-      <p:par>
-        <p:cTn xmlns:p14="http://schemas.microsoft.com/office/powerpoint/2010/main" id="1" dur="indefinite" restart="never" nodeType="tmRoot"/>
-      </p:par>
-    </p:tnLst>
-  </p:timing>
-</p:sld>
-</file>
-
-<file path=ppt/slides/slide44.xml><?xml version="1.0" encoding="utf-8"?>
-<p:sld xmlns:a="http://schemas.openxmlformats.org/drawingml/2006/main" xmlns:r="http://schemas.openxmlformats.org/officeDocument/2006/relationships" xmlns:p="http://schemas.openxmlformats.org/presentationml/2006/main">
-  <p:cSld>
-    <p:spTree>
-      <p:nvGrpSpPr>
-        <p:cNvPr id="1" name=""/>
-        <p:cNvGrpSpPr/>
-        <p:nvPr/>
-      </p:nvGrpSpPr>
-      <p:grpSpPr>
-        <a:xfrm>
-          <a:off x="0" y="0"/>
-          <a:ext cx="0" cy="0"/>
-          <a:chOff x="0" y="0"/>
-          <a:chExt cx="0" cy="0"/>
-        </a:xfrm>
-      </p:grpSpPr>
-      <p:sp>
-        <p:nvSpPr>
-          <p:cNvPr id="2" name="Title 1"/>
-          <p:cNvSpPr>
-            <a:spLocks noGrp="1"/>
-          </p:cNvSpPr>
-          <p:nvPr>
-            <p:ph type="title"/>
-          </p:nvPr>
-        </p:nvSpPr>
-        <p:spPr/>
-        <p:txBody>
-          <a:bodyPr/>
-          <a:lstStyle/>
-          <a:p>
-            <a:r>
-              <a:rPr lang="en-US" dirty="0" smtClean="0"/>
-              <a:t>Ambiguity in Complex Arrays</a:t>
-            </a:r>
-            <a:endParaRPr lang="en-US" dirty="0"/>
-          </a:p>
-        </p:txBody>
-      </p:sp>
-      <p:sp>
-        <p:nvSpPr>
-          <p:cNvPr id="3" name="Content Placeholder 2"/>
-          <p:cNvSpPr>
-            <a:spLocks noGrp="1"/>
-          </p:cNvSpPr>
-          <p:nvPr>
-            <p:ph idx="1"/>
-          </p:nvPr>
-        </p:nvSpPr>
-        <p:spPr/>
-        <p:txBody>
-          <a:bodyPr/>
-          <a:lstStyle/>
-          <a:p>
-            <a:r>
-              <a:rPr lang="en-US" dirty="0" smtClean="0"/>
-              <a:t>Indexes are</a:t>
-            </a:r>
-            <a:r>
-              <a:rPr lang="en-US" baseline="0" dirty="0" smtClean="0"/>
-              <a:t> like poorly named variables</a:t>
+              <a:t>poorly named variables</a:t>
             </a:r>
           </a:p>
         </p:txBody>
@@ -12787,7 +12675,7 @@
 </p:sld>
 </file>
 
-<file path=ppt/slides/slide45.xml><?xml version="1.0" encoding="utf-8"?>
+<file path=ppt/slides/slide44.xml><?xml version="1.0" encoding="utf-8"?>
 <p:sld xmlns:a="http://schemas.openxmlformats.org/drawingml/2006/main" xmlns:r="http://schemas.openxmlformats.org/officeDocument/2006/relationships" xmlns:p="http://schemas.openxmlformats.org/presentationml/2006/main">
   <p:cSld>
     <p:spTree>
@@ -14419,6 +14307,171 @@
 </p:sld>
 </file>
 
+<file path=ppt/slides/slide45.xml><?xml version="1.0" encoding="utf-8"?>
+<p:sld xmlns:a="http://schemas.openxmlformats.org/drawingml/2006/main" xmlns:r="http://schemas.openxmlformats.org/officeDocument/2006/relationships" xmlns:p="http://schemas.openxmlformats.org/presentationml/2006/main">
+  <p:cSld>
+    <p:spTree>
+      <p:nvGrpSpPr>
+        <p:cNvPr id="1" name=""/>
+        <p:cNvGrpSpPr/>
+        <p:nvPr/>
+      </p:nvGrpSpPr>
+      <p:grpSpPr>
+        <a:xfrm>
+          <a:off x="0" y="0"/>
+          <a:ext cx="0" cy="0"/>
+          <a:chOff x="0" y="0"/>
+          <a:chExt cx="0" cy="0"/>
+        </a:xfrm>
+      </p:grpSpPr>
+      <p:sp>
+        <p:nvSpPr>
+          <p:cNvPr id="2" name="Title 1"/>
+          <p:cNvSpPr>
+            <a:spLocks noGrp="1"/>
+          </p:cNvSpPr>
+          <p:nvPr>
+            <p:ph type="title"/>
+          </p:nvPr>
+        </p:nvSpPr>
+        <p:spPr/>
+        <p:txBody>
+          <a:bodyPr/>
+          <a:lstStyle/>
+          <a:p>
+            <a:r>
+              <a:rPr lang="en-US" dirty="0" smtClean="0"/>
+              <a:t>Ambiguity in Complex Arrays</a:t>
+            </a:r>
+            <a:endParaRPr lang="en-US" dirty="0"/>
+          </a:p>
+        </p:txBody>
+      </p:sp>
+      <p:sp>
+        <p:nvSpPr>
+          <p:cNvPr id="3" name="Content Placeholder 2"/>
+          <p:cNvSpPr>
+            <a:spLocks noGrp="1"/>
+          </p:cNvSpPr>
+          <p:nvPr>
+            <p:ph idx="1"/>
+          </p:nvPr>
+        </p:nvSpPr>
+        <p:spPr>
+          <a:xfrm>
+            <a:off x="302364" y="1862668"/>
+            <a:ext cx="8384436" cy="2199466"/>
+          </a:xfrm>
+        </p:spPr>
+        <p:txBody>
+          <a:bodyPr/>
+          <a:lstStyle/>
+          <a:p>
+            <a:r>
+              <a:rPr lang="en-US" dirty="0"/>
+              <a:t>team = [["number", "name", "position", "points per game"],</a:t>
+            </a:r>
+          </a:p>
+          <a:p>
+            <a:r>
+              <a:rPr lang="en-US" dirty="0"/>
+              <a:t>        [12, "Joe </a:t>
+            </a:r>
+            <a:r>
+              <a:rPr lang="en-US" dirty="0" err="1"/>
+              <a:t>Schmo</a:t>
+            </a:r>
+            <a:r>
+              <a:rPr lang="en-US" dirty="0"/>
+              <a:t>", "Center", [14, 32, 7, 0, 23]],</a:t>
+            </a:r>
+          </a:p>
+          <a:p>
+            <a:r>
+              <a:rPr lang="en-US" dirty="0"/>
+              <a:t>        [9, "Ms. Buckets", "Point Guard", [19, 0, 11, 22, 0]],</a:t>
+            </a:r>
+          </a:p>
+          <a:p>
+            <a:r>
+              <a:rPr lang="en-US" dirty="0"/>
+              <a:t>        [31, "Harvey Kay", "Shooting Guard", [0, 30, 16, 0, 25]],</a:t>
+            </a:r>
+          </a:p>
+          <a:p>
+            <a:r>
+              <a:rPr lang="en-US" dirty="0"/>
+              <a:t>        [18, "Sally </a:t>
+            </a:r>
+            <a:r>
+              <a:rPr lang="en-US" dirty="0" err="1"/>
+              <a:t>Talls</a:t>
+            </a:r>
+            <a:r>
+              <a:rPr lang="en-US" dirty="0"/>
+              <a:t>", "Power Forward", [18, 29, 26, 31, 19]],</a:t>
+            </a:r>
+          </a:p>
+          <a:p>
+            <a:r>
+              <a:rPr lang="en-US" dirty="0"/>
+              <a:t>        [22, "MK </a:t>
+            </a:r>
+            <a:r>
+              <a:rPr lang="en-US" dirty="0" err="1"/>
+              <a:t>DiBoux</a:t>
+            </a:r>
+            <a:r>
+              <a:rPr lang="en-US" dirty="0"/>
+              <a:t>", "Small Forward", [11, 0, 23, 17, 0]]]</a:t>
+            </a:r>
+            <a:endParaRPr lang="en-US" dirty="0" smtClean="0"/>
+          </a:p>
+        </p:txBody>
+      </p:sp>
+      <p:sp>
+        <p:nvSpPr>
+          <p:cNvPr id="4" name="Footer Placeholder 3"/>
+          <p:cNvSpPr>
+            <a:spLocks noGrp="1"/>
+          </p:cNvSpPr>
+          <p:nvPr>
+            <p:ph type="ftr" sz="quarter" idx="3"/>
+          </p:nvPr>
+        </p:nvSpPr>
+        <p:spPr/>
+        <p:txBody>
+          <a:bodyPr/>
+          <a:lstStyle/>
+          <a:p>
+            <a:r>
+              <a:rPr lang="en-US" smtClean="0"/>
+              <a:t>Nested Data Structures: Arrays and Hashes</a:t>
+            </a:r>
+            <a:endParaRPr lang="en-US" dirty="0"/>
+          </a:p>
+        </p:txBody>
+      </p:sp>
+    </p:spTree>
+    <p:extLst>
+      <p:ext uri="{BB962C8B-B14F-4D97-AF65-F5344CB8AC3E}">
+        <p14:creationId xmlns:p14="http://schemas.microsoft.com/office/powerpoint/2010/main" val="2611690620"/>
+      </p:ext>
+    </p:extLst>
+  </p:cSld>
+  <p:clrMapOvr>
+    <a:masterClrMapping/>
+  </p:clrMapOvr>
+  <p:timing>
+    <p:tnLst>
+      <p:par>
+        <p:cTn xmlns:p14="http://schemas.microsoft.com/office/powerpoint/2010/main" id="1" dur="indefinite" restart="never" nodeType="tmRoot"/>
+      </p:par>
+    </p:tnLst>
+  </p:timing>
+</p:sld>
+</file>
+
 <file path=ppt/slides/slide46.xml><?xml version="1.0" encoding="utf-8"?>
 <p:sld xmlns:a="http://schemas.openxmlformats.org/drawingml/2006/main" xmlns:r="http://schemas.openxmlformats.org/officeDocument/2006/relationships" xmlns:p="http://schemas.openxmlformats.org/presentationml/2006/main">
   <p:cSld>
@@ -14471,8 +14524,8 @@
         </p:nvSpPr>
         <p:spPr>
           <a:xfrm>
-            <a:off x="302364" y="1862668"/>
-            <a:ext cx="8384436" cy="2199466"/>
+            <a:off x="457200" y="1862667"/>
+            <a:ext cx="8229600" cy="3877733"/>
           </a:xfrm>
         </p:spPr>
         <p:txBody>
@@ -14480,64 +14533,22 @@
           <a:lstStyle/>
           <a:p>
             <a:r>
-              <a:rPr lang="en-US" dirty="0"/>
-              <a:t>team = [["number", "name", "position", "points per game"],</a:t>
-            </a:r>
-          </a:p>
-          <a:p>
-            <a:r>
-              <a:rPr lang="en-US" dirty="0"/>
-              <a:t>        [12, "Joe </a:t>
-            </a:r>
-            <a:r>
-              <a:rPr lang="en-US" dirty="0" err="1"/>
-              <a:t>Schmo</a:t>
-            </a:r>
-            <a:r>
-              <a:rPr lang="en-US" dirty="0"/>
-              <a:t>", "Center", [14, 32, 7, 0, 23]],</a:t>
-            </a:r>
-          </a:p>
-          <a:p>
-            <a:r>
-              <a:rPr lang="en-US" dirty="0"/>
-              <a:t>        [9, "Ms. Buckets", "Point Guard", [19, 0, 11, 22, 0]],</a:t>
-            </a:r>
-          </a:p>
-          <a:p>
-            <a:r>
-              <a:rPr lang="en-US" dirty="0"/>
-              <a:t>        [31, "Harvey Kay", "Shooting Guard", [0, 30, 16, 0, 25]],</a:t>
-            </a:r>
-          </a:p>
-          <a:p>
-            <a:r>
-              <a:rPr lang="en-US" dirty="0"/>
-              <a:t>        [18, "Sally </a:t>
-            </a:r>
-            <a:r>
-              <a:rPr lang="en-US" dirty="0" err="1"/>
+              <a:rPr lang="en-US" dirty="0" smtClean="0"/>
+              <a:t>How do I get the data for Sally </a:t>
+            </a:r>
+            <a:r>
+              <a:rPr lang="en-US" dirty="0" err="1" smtClean="0"/>
               <a:t>Talls</a:t>
             </a:r>
             <a:r>
-              <a:rPr lang="en-US" dirty="0"/>
-              <a:t>", "Power Forward", [18, 29, 26, 31, 19]],</a:t>
-            </a:r>
-          </a:p>
-          <a:p>
-            <a:r>
-              <a:rPr lang="en-US" dirty="0"/>
-              <a:t>        [22, "MK </a:t>
-            </a:r>
-            <a:r>
-              <a:rPr lang="en-US" dirty="0" err="1"/>
-              <a:t>DiBoux</a:t>
-            </a:r>
-            <a:r>
-              <a:rPr lang="en-US" dirty="0"/>
-              <a:t>", "Small Forward", [11, 0, 23, 17, 0]]]</a:t>
-            </a:r>
-            <a:endParaRPr lang="en-US" dirty="0" smtClean="0"/>
+              <a:rPr lang="en-US" dirty="0" smtClean="0"/>
+              <a:t>?</a:t>
+            </a:r>
+            <a:endParaRPr lang="en-US" dirty="0" smtClean="0">
+              <a:solidFill>
+                <a:schemeClr val="accent3"/>
+              </a:solidFill>
+            </a:endParaRPr>
           </a:p>
         </p:txBody>
       </p:sp>
@@ -14567,7 +14578,7 @@
     </p:spTree>
     <p:extLst>
       <p:ext uri="{BB962C8B-B14F-4D97-AF65-F5344CB8AC3E}">
-        <p14:creationId xmlns:p14="http://schemas.microsoft.com/office/powerpoint/2010/main" val="2611690620"/>
+        <p14:creationId xmlns:p14="http://schemas.microsoft.com/office/powerpoint/2010/main" val="2691205601"/>
       </p:ext>
     </p:extLst>
   </p:cSld>
@@ -14626,7 +14637,7 @@
       </p:sp>
       <p:sp>
         <p:nvSpPr>
-          <p:cNvPr id="3" name="Content Placeholder 2"/>
+          <p:cNvPr id="5" name="Content Placeholder 4"/>
           <p:cNvSpPr>
             <a:spLocks noGrp="1"/>
           </p:cNvSpPr>
@@ -14636,8 +14647,8 @@
         </p:nvSpPr>
         <p:spPr>
           <a:xfrm>
-            <a:off x="457200" y="1862667"/>
-            <a:ext cx="8229600" cy="3877733"/>
+            <a:off x="218275" y="1862667"/>
+            <a:ext cx="8468525" cy="3877733"/>
           </a:xfrm>
         </p:spPr>
         <p:txBody>
@@ -14645,22 +14656,77 @@
           <a:lstStyle/>
           <a:p>
             <a:r>
-              <a:rPr lang="en-US" dirty="0" smtClean="0"/>
-              <a:t>How do I get the data for Sally </a:t>
-            </a:r>
+              <a:rPr lang="en-US" dirty="0"/>
+              <a:t>team = [["number", "name", "position", "points per game"],</a:t>
+            </a:r>
+          </a:p>
+          <a:p>
+            <a:r>
+              <a:rPr lang="en-US" dirty="0"/>
+              <a:t>        [12, "Joe </a:t>
+            </a:r>
+            <a:r>
+              <a:rPr lang="en-US" dirty="0" err="1"/>
+              <a:t>Schmo</a:t>
+            </a:r>
+            <a:r>
+              <a:rPr lang="en-US" dirty="0"/>
+              <a:t>", "Center", [14, 32, 7, 0, 23]],</a:t>
+            </a:r>
+          </a:p>
+          <a:p>
+            <a:r>
+              <a:rPr lang="en-US" dirty="0"/>
+              <a:t>        [9, "Ms. Buckets", "Point Guard", [19, 0, 11, 22, 0]],</a:t>
+            </a:r>
+          </a:p>
+          <a:p>
+            <a:r>
+              <a:rPr lang="en-US" dirty="0"/>
+              <a:t>        [31, "Harvey Kay", "Shooting Guard", [0, 30, 16, 0, 25]],</a:t>
+            </a:r>
+          </a:p>
+          <a:p>
+            <a:r>
+              <a:rPr lang="en-US" dirty="0"/>
+              <a:t>        [18, "Sally </a:t>
+            </a:r>
+            <a:r>
+              <a:rPr lang="en-US" dirty="0" err="1"/>
+              <a:t>Talls</a:t>
+            </a:r>
+            <a:r>
+              <a:rPr lang="en-US" dirty="0"/>
+              <a:t>", "Power Forward", [18, 29, 26, 31, 19]],</a:t>
+            </a:r>
+          </a:p>
+          <a:p>
+            <a:r>
+              <a:rPr lang="en-US" dirty="0"/>
+              <a:t>        [22, "MK </a:t>
+            </a:r>
+            <a:r>
+              <a:rPr lang="en-US" dirty="0" err="1"/>
+              <a:t>DiBoux</a:t>
+            </a:r>
+            <a:r>
+              <a:rPr lang="en-US" dirty="0"/>
+              <a:t>", "Small Forward", [11, 0, 23, 17, 0]]]</a:t>
+            </a:r>
+          </a:p>
+          <a:p>
+            <a:endParaRPr lang="en-US" dirty="0" smtClean="0"/>
+          </a:p>
+          <a:p>
             <a:r>
               <a:rPr lang="en-US" dirty="0" err="1" smtClean="0"/>
-              <a:t>Talls</a:t>
-            </a:r>
-            <a:r>
-              <a:rPr lang="en-US" dirty="0" smtClean="0"/>
-              <a:t>?</a:t>
-            </a:r>
-            <a:endParaRPr lang="en-US" dirty="0" smtClean="0">
-              <a:solidFill>
-                <a:schemeClr val="accent3"/>
-              </a:solidFill>
-            </a:endParaRPr>
+              <a:t>sally_talls</a:t>
+            </a:r>
+            <a:r>
+              <a:rPr lang="en-US" dirty="0" smtClean="0"/>
+              <a:t> = team[4]</a:t>
+            </a:r>
+            <a:endParaRPr lang="en-US" dirty="0"/>
           </a:p>
         </p:txBody>
       </p:sp>
@@ -14690,7 +14756,7 @@
     </p:spTree>
     <p:extLst>
       <p:ext uri="{BB962C8B-B14F-4D97-AF65-F5344CB8AC3E}">
-        <p14:creationId xmlns:p14="http://schemas.microsoft.com/office/powerpoint/2010/main" val="2691205601"/>
+        <p14:creationId xmlns:p14="http://schemas.microsoft.com/office/powerpoint/2010/main" val="2473295739"/>
       </p:ext>
     </p:extLst>
   </p:cSld>
@@ -14759,8 +14825,8 @@
         </p:nvSpPr>
         <p:spPr>
           <a:xfrm>
-            <a:off x="218275" y="1862667"/>
-            <a:ext cx="8468525" cy="3877733"/>
+            <a:off x="128981" y="1862667"/>
+            <a:ext cx="8750856" cy="3877733"/>
           </a:xfrm>
         </p:spPr>
         <p:txBody>
@@ -14823,11 +14889,15 @@
             </a:r>
             <a:r>
               <a:rPr lang="en-US" dirty="0"/>
-              <a:t>", "Small Forward", [11, 0, 23, 17, 0]]]</a:t>
-            </a:r>
-          </a:p>
-          <a:p>
-            <a:endParaRPr lang="en-US" dirty="0" smtClean="0"/>
+              <a:t>", "Small Forward", [11, 0, 23, 17, 0]]</a:t>
+            </a:r>
+            <a:r>
+              <a:rPr lang="en-US" dirty="0" smtClean="0"/>
+              <a:t>]</a:t>
+            </a:r>
+          </a:p>
+          <a:p>
+            <a:endParaRPr lang="en-US" dirty="0"/>
           </a:p>
           <a:p>
             <a:r>
@@ -14836,7 +14906,31 @@
             </a:r>
             <a:r>
               <a:rPr lang="en-US" dirty="0" smtClean="0"/>
-              <a:t> = team[4]</a:t>
+              <a:t> = </a:t>
+            </a:r>
+            <a:r>
+              <a:rPr lang="en-US" dirty="0" err="1" smtClean="0"/>
+              <a:t>team.find</a:t>
+            </a:r>
+            <a:r>
+              <a:rPr lang="en-US" dirty="0" smtClean="0"/>
+              <a:t> { |player| player[1</a:t>
+            </a:r>
+            <a:r>
+              <a:rPr lang="en-US" smtClean="0"/>
+              <a:t>] == </a:t>
+            </a:r>
+            <a:r>
+              <a:rPr lang="en-US" dirty="0" smtClean="0"/>
+              <a:t>“Sally </a:t>
+            </a:r>
+            <a:r>
+              <a:rPr lang="en-US" dirty="0" err="1" smtClean="0"/>
+              <a:t>Talls</a:t>
+            </a:r>
+            <a:r>
+              <a:rPr lang="en-US" dirty="0" smtClean="0"/>
+              <a:t>” }</a:t>
             </a:r>
             <a:endParaRPr lang="en-US" dirty="0"/>
           </a:p>
@@ -14868,7 +14962,7 @@
     </p:spTree>
     <p:extLst>
       <p:ext uri="{BB962C8B-B14F-4D97-AF65-F5344CB8AC3E}">
-        <p14:creationId xmlns:p14="http://schemas.microsoft.com/office/powerpoint/2010/main" val="2473295739"/>
+        <p14:creationId xmlns:p14="http://schemas.microsoft.com/office/powerpoint/2010/main" val="649400054"/>
       </p:ext>
     </p:extLst>
   </p:cSld>
@@ -14927,7 +15021,7 @@
       </p:sp>
       <p:sp>
         <p:nvSpPr>
-          <p:cNvPr id="5" name="Content Placeholder 4"/>
+          <p:cNvPr id="3" name="Content Placeholder 2"/>
           <p:cNvSpPr>
             <a:spLocks noGrp="1"/>
           </p:cNvSpPr>
@@ -14937,8 +15031,8 @@
         </p:nvSpPr>
         <p:spPr>
           <a:xfrm>
-            <a:off x="128981" y="1862667"/>
-            <a:ext cx="8750856" cy="3877733"/>
+            <a:off x="188511" y="1862667"/>
+            <a:ext cx="8498289" cy="3877733"/>
           </a:xfrm>
         </p:spPr>
         <p:txBody>
@@ -15001,50 +15095,9 @@
             </a:r>
             <a:r>
               <a:rPr lang="en-US" dirty="0"/>
-              <a:t>", "Small Forward", [11, 0, 23, 17, 0]]</a:t>
-            </a:r>
-            <a:r>
-              <a:rPr lang="en-US" dirty="0" smtClean="0"/>
-              <a:t>]</a:t>
-            </a:r>
-          </a:p>
-          <a:p>
-            <a:endParaRPr lang="en-US" dirty="0"/>
-          </a:p>
-          <a:p>
-            <a:r>
-              <a:rPr lang="en-US" dirty="0" err="1" smtClean="0"/>
-              <a:t>sally_talls</a:t>
-            </a:r>
-            <a:r>
-              <a:rPr lang="en-US" dirty="0" smtClean="0"/>
-              <a:t> = </a:t>
-            </a:r>
-            <a:r>
-              <a:rPr lang="en-US" dirty="0" err="1" smtClean="0"/>
-              <a:t>team.find</a:t>
-            </a:r>
-            <a:r>
-              <a:rPr lang="en-US" dirty="0" smtClean="0"/>
-              <a:t> { |player| player[1</a:t>
-            </a:r>
-            <a:r>
-              <a:rPr lang="en-US" smtClean="0"/>
-              <a:t>] == </a:t>
-            </a:r>
-            <a:r>
-              <a:rPr lang="en-US" dirty="0" smtClean="0"/>
-              <a:t>“Sally </a:t>
-            </a:r>
-            <a:r>
-              <a:rPr lang="en-US" dirty="0" err="1" smtClean="0"/>
-              <a:t>Talls</a:t>
-            </a:r>
-            <a:r>
-              <a:rPr lang="en-US" dirty="0" smtClean="0"/>
-              <a:t>” }</a:t>
-            </a:r>
-            <a:endParaRPr lang="en-US" dirty="0"/>
+              <a:t>", "Small Forward", [11, 0, 23, 17, 0]]]</a:t>
+            </a:r>
+            <a:endParaRPr lang="en-US" dirty="0" smtClean="0"/>
           </a:p>
         </p:txBody>
       </p:sp>
@@ -15074,7 +15127,7 @@
     </p:spTree>
     <p:extLst>
       <p:ext uri="{BB962C8B-B14F-4D97-AF65-F5344CB8AC3E}">
-        <p14:creationId xmlns:p14="http://schemas.microsoft.com/office/powerpoint/2010/main" val="649400054"/>
+        <p14:creationId xmlns:p14="http://schemas.microsoft.com/office/powerpoint/2010/main" val="3031488992"/>
       </p:ext>
     </p:extLst>
   </p:cSld>
@@ -15731,75 +15784,42 @@
             <p:ph idx="1"/>
           </p:nvPr>
         </p:nvSpPr>
-        <p:spPr>
-          <a:xfrm>
-            <a:off x="188511" y="1862667"/>
-            <a:ext cx="8498289" cy="3877733"/>
-          </a:xfrm>
-        </p:spPr>
+        <p:spPr/>
         <p:txBody>
           <a:bodyPr/>
           <a:lstStyle/>
           <a:p>
-            <a:r>
-              <a:rPr lang="en-US" dirty="0"/>
-              <a:t>team = [["number", "name", "position", "points per game"],</a:t>
-            </a:r>
-          </a:p>
-          <a:p>
-            <a:r>
-              <a:rPr lang="en-US" dirty="0"/>
-              <a:t>        [12, "Joe </a:t>
-            </a:r>
-            <a:r>
-              <a:rPr lang="en-US" dirty="0" err="1"/>
+            <a:pPr marL="342900" indent="-342900"/>
+            <a:r>
+              <a:rPr lang="en-US" dirty="0" smtClean="0"/>
+              <a:t>What</a:t>
+            </a:r>
+            <a:r>
+              <a:rPr lang="en-US" baseline="0" dirty="0" smtClean="0"/>
+              <a:t> position does Ms. Buckets play?</a:t>
+            </a:r>
+          </a:p>
+          <a:p>
+            <a:pPr marL="342900" indent="-342900"/>
+            <a:r>
+              <a:rPr lang="en-US" baseline="0" dirty="0" smtClean="0"/>
+              <a:t>What number does Harvey Kay wear?</a:t>
+            </a:r>
+          </a:p>
+          <a:p>
+            <a:pPr marL="342900" indent="-342900"/>
+            <a:r>
+              <a:rPr lang="en-US" dirty="0" smtClean="0"/>
+              <a:t>How many points did Joe </a:t>
+            </a:r>
+            <a:r>
+              <a:rPr lang="en-US" dirty="0" err="1" smtClean="0"/>
               <a:t>Schmo</a:t>
             </a:r>
             <a:r>
-              <a:rPr lang="en-US" dirty="0"/>
-              <a:t>", "Center", [14, 32, 7, 0, 23]],</a:t>
-            </a:r>
-          </a:p>
-          <a:p>
-            <a:r>
-              <a:rPr lang="en-US" dirty="0"/>
-              <a:t>        [9, "Ms. Buckets", "Point Guard", [19, 0, 11, 22, 0]],</a:t>
-            </a:r>
-          </a:p>
-          <a:p>
-            <a:r>
-              <a:rPr lang="en-US" dirty="0"/>
-              <a:t>        [31, "Harvey Kay", "Shooting Guard", [0, 30, 16, 0, 25]],</a:t>
-            </a:r>
-          </a:p>
-          <a:p>
-            <a:r>
-              <a:rPr lang="en-US" dirty="0"/>
-              <a:t>        [18, "Sally </a:t>
-            </a:r>
-            <a:r>
-              <a:rPr lang="en-US" dirty="0" err="1"/>
-              <a:t>Talls</a:t>
-            </a:r>
-            <a:r>
-              <a:rPr lang="en-US" dirty="0"/>
-              <a:t>", "Power Forward", [18, 29, 26, 31, 19]],</a:t>
-            </a:r>
-          </a:p>
-          <a:p>
-            <a:r>
-              <a:rPr lang="en-US" dirty="0"/>
-              <a:t>        [22, "MK </a:t>
-            </a:r>
-            <a:r>
-              <a:rPr lang="en-US" dirty="0" err="1"/>
-              <a:t>DiBoux</a:t>
-            </a:r>
-            <a:r>
-              <a:rPr lang="en-US" dirty="0"/>
-              <a:t>", "Small Forward", [11, 0, 23, 17, 0]]]</a:t>
-            </a:r>
-            <a:endParaRPr lang="en-US" dirty="0" smtClean="0"/>
+              <a:rPr lang="en-US" dirty="0" smtClean="0"/>
+              <a:t> score in Game 3?</a:t>
+            </a:r>
           </a:p>
         </p:txBody>
       </p:sp>
@@ -15829,7 +15849,7 @@
     </p:spTree>
     <p:extLst>
       <p:ext uri="{BB962C8B-B14F-4D97-AF65-F5344CB8AC3E}">
-        <p14:creationId xmlns:p14="http://schemas.microsoft.com/office/powerpoint/2010/main" val="3031488992"/>
+        <p14:creationId xmlns:p14="http://schemas.microsoft.com/office/powerpoint/2010/main" val="1699637138"/>
       </p:ext>
     </p:extLst>
   </p:cSld>
@@ -15901,37 +15921,19 @@
           <a:bodyPr/>
           <a:lstStyle/>
           <a:p>
-            <a:pPr marL="342900" indent="-342900"/>
-            <a:r>
-              <a:rPr lang="en-US" dirty="0" smtClean="0"/>
-              <a:t>What</a:t>
+            <a:r>
+              <a:rPr lang="en-US" dirty="0" smtClean="0"/>
+              <a:t>What values</a:t>
             </a:r>
             <a:r>
               <a:rPr lang="en-US" baseline="0" dirty="0" smtClean="0"/>
-              <a:t> position does Ms. Buckets play?</a:t>
-            </a:r>
-          </a:p>
-          <a:p>
-            <a:pPr marL="342900" indent="-342900"/>
-            <a:r>
-              <a:rPr lang="en-US" baseline="0" dirty="0" smtClean="0"/>
-              <a:t>What number does Harvey Kay wear?</a:t>
-            </a:r>
-          </a:p>
-          <a:p>
-            <a:pPr marL="342900" indent="-342900"/>
-            <a:r>
-              <a:rPr lang="en-US" dirty="0" smtClean="0"/>
-              <a:t>How many points did Joe </a:t>
-            </a:r>
-            <a:r>
-              <a:rPr lang="en-US" dirty="0" err="1" smtClean="0"/>
-              <a:t>Schmo</a:t>
-            </a:r>
-            <a:r>
-              <a:rPr lang="en-US" dirty="0" smtClean="0"/>
-              <a:t> score in Game 3?</a:t>
-            </a:r>
+              <a:t> do these return?</a:t>
+            </a:r>
+            <a:endParaRPr lang="en-US" baseline="0" dirty="0" smtClean="0">
+              <a:solidFill>
+                <a:srgbClr val="7E7F80"/>
+              </a:solidFill>
+            </a:endParaRPr>
           </a:p>
         </p:txBody>
       </p:sp>
@@ -15958,10 +15960,229 @@
           </a:p>
         </p:txBody>
       </p:sp>
+      <p:sp>
+        <p:nvSpPr>
+          <p:cNvPr id="5" name="Content Placeholder 2"/>
+          <p:cNvSpPr txBox="1">
+            <a:spLocks/>
+          </p:cNvSpPr>
+          <p:nvPr/>
+        </p:nvSpPr>
+        <p:spPr>
+          <a:xfrm>
+            <a:off x="457200" y="2981540"/>
+            <a:ext cx="8229600" cy="2758860"/>
+          </a:xfrm>
+          <a:prstGeom prst="rect">
+            <a:avLst/>
+          </a:prstGeom>
+        </p:spPr>
+        <p:txBody>
+          <a:bodyPr vert="horz" lIns="91440" tIns="45720" rIns="91440" bIns="45720" rtlCol="0">
+            <a:normAutofit/>
+          </a:bodyPr>
+          <a:lstStyle>
+            <a:lvl1pPr marL="342900" indent="-342900" algn="l" defTabSz="457200" rtl="0" eaLnBrk="1" latinLnBrk="0" hangingPunct="1">
+              <a:spcBef>
+                <a:spcPct val="20000"/>
+              </a:spcBef>
+              <a:buFont typeface="Arial"/>
+              <a:buChar char="•"/>
+              <a:defRPr sz="3200" kern="1200">
+                <a:solidFill>
+                  <a:schemeClr val="accent2"/>
+                </a:solidFill>
+                <a:latin typeface="+mn-lt"/>
+                <a:ea typeface="+mn-ea"/>
+                <a:cs typeface="+mn-cs"/>
+              </a:defRPr>
+            </a:lvl1pPr>
+            <a:lvl2pPr marL="742950" indent="-285750" algn="l" defTabSz="457200" rtl="0" eaLnBrk="1" latinLnBrk="0" hangingPunct="1">
+              <a:spcBef>
+                <a:spcPct val="20000"/>
+              </a:spcBef>
+              <a:buFont typeface="Arial"/>
+              <a:buChar char="•"/>
+              <a:defRPr sz="2800" kern="1200">
+                <a:solidFill>
+                  <a:schemeClr val="accent3"/>
+                </a:solidFill>
+                <a:latin typeface="+mn-lt"/>
+                <a:ea typeface="+mn-ea"/>
+                <a:cs typeface="+mn-cs"/>
+              </a:defRPr>
+            </a:lvl2pPr>
+            <a:lvl3pPr marL="1143000" indent="-228600" algn="l" defTabSz="457200" rtl="0" eaLnBrk="1" latinLnBrk="0" hangingPunct="1">
+              <a:spcBef>
+                <a:spcPct val="20000"/>
+              </a:spcBef>
+              <a:buFont typeface="Arial"/>
+              <a:buChar char="•"/>
+              <a:defRPr sz="2400" kern="1200">
+                <a:solidFill>
+                  <a:schemeClr val="accent3"/>
+                </a:solidFill>
+                <a:latin typeface="+mn-lt"/>
+                <a:ea typeface="+mn-ea"/>
+                <a:cs typeface="+mn-cs"/>
+              </a:defRPr>
+            </a:lvl3pPr>
+            <a:lvl4pPr marL="1600200" indent="-228600" algn="l" defTabSz="457200" rtl="0" eaLnBrk="1" latinLnBrk="0" hangingPunct="1">
+              <a:spcBef>
+                <a:spcPct val="20000"/>
+              </a:spcBef>
+              <a:buFont typeface="Arial"/>
+              <a:buChar char="•"/>
+              <a:defRPr sz="2000" kern="1200">
+                <a:solidFill>
+                  <a:schemeClr val="accent3"/>
+                </a:solidFill>
+                <a:latin typeface="+mn-lt"/>
+                <a:ea typeface="+mn-ea"/>
+                <a:cs typeface="+mn-cs"/>
+              </a:defRPr>
+            </a:lvl4pPr>
+            <a:lvl5pPr marL="2057400" indent="-228600" algn="l" defTabSz="457200" rtl="0" eaLnBrk="1" latinLnBrk="0" hangingPunct="1">
+              <a:spcBef>
+                <a:spcPct val="20000"/>
+              </a:spcBef>
+              <a:buFont typeface="Arial"/>
+              <a:buChar char="•"/>
+              <a:defRPr sz="2000" kern="1200">
+                <a:solidFill>
+                  <a:schemeClr val="accent3"/>
+                </a:solidFill>
+                <a:latin typeface="+mn-lt"/>
+                <a:ea typeface="+mn-ea"/>
+                <a:cs typeface="+mn-cs"/>
+              </a:defRPr>
+            </a:lvl5pPr>
+            <a:lvl6pPr marL="2514600" indent="-228600" algn="l" defTabSz="457200" rtl="0" eaLnBrk="1" latinLnBrk="0" hangingPunct="1">
+              <a:spcBef>
+                <a:spcPct val="20000"/>
+              </a:spcBef>
+              <a:buFont typeface="Arial"/>
+              <a:buChar char="•"/>
+              <a:defRPr sz="2000" kern="1200">
+                <a:solidFill>
+                  <a:schemeClr val="tx1"/>
+                </a:solidFill>
+                <a:latin typeface="+mn-lt"/>
+                <a:ea typeface="+mn-ea"/>
+                <a:cs typeface="+mn-cs"/>
+              </a:defRPr>
+            </a:lvl6pPr>
+            <a:lvl7pPr marL="2971800" indent="-228600" algn="l" defTabSz="457200" rtl="0" eaLnBrk="1" latinLnBrk="0" hangingPunct="1">
+              <a:spcBef>
+                <a:spcPct val="20000"/>
+              </a:spcBef>
+              <a:buFont typeface="Arial"/>
+              <a:buChar char="•"/>
+              <a:defRPr sz="2000" kern="1200">
+                <a:solidFill>
+                  <a:schemeClr val="tx1"/>
+                </a:solidFill>
+                <a:latin typeface="+mn-lt"/>
+                <a:ea typeface="+mn-ea"/>
+                <a:cs typeface="+mn-cs"/>
+              </a:defRPr>
+            </a:lvl7pPr>
+            <a:lvl8pPr marL="3429000" indent="-228600" algn="l" defTabSz="457200" rtl="0" eaLnBrk="1" latinLnBrk="0" hangingPunct="1">
+              <a:spcBef>
+                <a:spcPct val="20000"/>
+              </a:spcBef>
+              <a:buFont typeface="Arial"/>
+              <a:buChar char="•"/>
+              <a:defRPr sz="2000" kern="1200">
+                <a:solidFill>
+                  <a:schemeClr val="tx1"/>
+                </a:solidFill>
+                <a:latin typeface="+mn-lt"/>
+                <a:ea typeface="+mn-ea"/>
+                <a:cs typeface="+mn-cs"/>
+              </a:defRPr>
+            </a:lvl8pPr>
+            <a:lvl9pPr marL="3886200" indent="-228600" algn="l" defTabSz="457200" rtl="0" eaLnBrk="1" latinLnBrk="0" hangingPunct="1">
+              <a:spcBef>
+                <a:spcPct val="20000"/>
+              </a:spcBef>
+              <a:buFont typeface="Arial"/>
+              <a:buChar char="•"/>
+              <a:defRPr sz="2000" kern="1200">
+                <a:solidFill>
+                  <a:schemeClr val="tx1"/>
+                </a:solidFill>
+                <a:latin typeface="+mn-lt"/>
+                <a:ea typeface="+mn-ea"/>
+                <a:cs typeface="+mn-cs"/>
+              </a:defRPr>
+            </a:lvl9pPr>
+          </a:lstStyle>
+          <a:p>
+            <a:pPr marL="0" indent="0">
+              <a:buNone/>
+            </a:pPr>
+            <a:r>
+              <a:rPr lang="en-US" sz="1500" dirty="0">
+                <a:latin typeface="Andale Mono"/>
+                <a:cs typeface="Andale Mono"/>
+              </a:rPr>
+              <a:t>team[2][0]</a:t>
+            </a:r>
+            <a:br>
+              <a:rPr lang="en-US" sz="1500" dirty="0">
+                <a:latin typeface="Andale Mono"/>
+                <a:cs typeface="Andale Mono"/>
+              </a:rPr>
+            </a:br>
+            <a:r>
+              <a:rPr lang="en-US" sz="1500" dirty="0" smtClean="0">
+                <a:latin typeface="Andale Mono"/>
+                <a:cs typeface="Andale Mono"/>
+              </a:rPr>
+              <a:t>team</a:t>
+            </a:r>
+            <a:r>
+              <a:rPr lang="en-US" sz="1500" dirty="0">
+                <a:latin typeface="Andale Mono"/>
+                <a:cs typeface="Andale Mono"/>
+              </a:rPr>
+              <a:t>[5][3][0</a:t>
+            </a:r>
+            <a:r>
+              <a:rPr lang="en-US" sz="1500" dirty="0" smtClean="0">
+                <a:latin typeface="Andale Mono"/>
+                <a:cs typeface="Andale Mono"/>
+              </a:rPr>
+              <a:t>]</a:t>
+            </a:r>
+            <a:r>
+              <a:rPr lang="en-US" sz="1500" dirty="0">
+                <a:latin typeface="Andale Mono"/>
+                <a:cs typeface="Andale Mono"/>
+              </a:rPr>
+              <a:t/>
+            </a:r>
+            <a:br>
+              <a:rPr lang="en-US" sz="1500" dirty="0">
+                <a:latin typeface="Andale Mono"/>
+                <a:cs typeface="Andale Mono"/>
+              </a:rPr>
+            </a:br>
+            <a:r>
+              <a:rPr lang="en-US" sz="1500" dirty="0">
+                <a:latin typeface="Andale Mono"/>
+                <a:cs typeface="Andale Mono"/>
+              </a:rPr>
+              <a:t>team[3][2]</a:t>
+            </a:r>
+          </a:p>
+        </p:txBody>
+      </p:sp>
     </p:spTree>
     <p:extLst>
       <p:ext uri="{BB962C8B-B14F-4D97-AF65-F5344CB8AC3E}">
-        <p14:creationId xmlns:p14="http://schemas.microsoft.com/office/powerpoint/2010/main" val="1699637138"/>
+        <p14:creationId xmlns:p14="http://schemas.microsoft.com/office/powerpoint/2010/main" val="2094196939"/>
       </p:ext>
     </p:extLst>
   </p:cSld>
@@ -16012,7 +16233,11 @@
           <a:p>
             <a:r>
               <a:rPr lang="en-US" dirty="0" smtClean="0"/>
-              <a:t>Ambiguity in Complex Arrays</a:t>
+              <a:t>Hashes Provide</a:t>
+            </a:r>
+            <a:r>
+              <a:rPr lang="en-US" baseline="0" dirty="0" smtClean="0"/>
+              <a:t> Informative Labels</a:t>
             </a:r>
             <a:endParaRPr lang="en-US" dirty="0"/>
           </a:p>
@@ -16020,7 +16245,7 @@
       </p:sp>
       <p:sp>
         <p:nvSpPr>
-          <p:cNvPr id="3" name="Content Placeholder 2"/>
+          <p:cNvPr id="5" name="Content Placeholder 4"/>
           <p:cNvSpPr>
             <a:spLocks noGrp="1"/>
           </p:cNvSpPr>
@@ -16028,24 +16253,198 @@
             <p:ph idx="1"/>
           </p:nvPr>
         </p:nvSpPr>
-        <p:spPr/>
-        <p:txBody>
-          <a:bodyPr/>
+        <p:spPr>
+          <a:xfrm>
+            <a:off x="99216" y="1418725"/>
+            <a:ext cx="9044784" cy="4762156"/>
+          </a:xfrm>
+        </p:spPr>
+        <p:txBody>
+          <a:bodyPr>
+            <a:normAutofit/>
+          </a:bodyPr>
           <a:lstStyle/>
           <a:p>
             <a:r>
-              <a:rPr lang="en-US" dirty="0" smtClean="0"/>
-              <a:t>What values</a:t>
-            </a:r>
-            <a:r>
-              <a:rPr lang="en-US" baseline="0" dirty="0" smtClean="0"/>
-              <a:t> do these return?</a:t>
-            </a:r>
-            <a:endParaRPr lang="en-US" baseline="0" dirty="0" smtClean="0">
-              <a:solidFill>
-                <a:srgbClr val="7E7F80"/>
-              </a:solidFill>
-            </a:endParaRPr>
+              <a:rPr lang="en-US" dirty="0" err="1"/>
+              <a:t>hash_team</a:t>
+            </a:r>
+            <a:r>
+              <a:rPr lang="en-US" dirty="0"/>
+              <a:t> = {</a:t>
+            </a:r>
+          </a:p>
+          <a:p>
+            <a:r>
+              <a:rPr lang="en-US" dirty="0"/>
+              <a:t>             </a:t>
+            </a:r>
+            <a:r>
+              <a:rPr lang="en-US" dirty="0" smtClean="0"/>
+              <a:t>"</a:t>
+            </a:r>
+            <a:r>
+              <a:rPr lang="en-US" dirty="0"/>
+              <a:t>Joe </a:t>
+            </a:r>
+            <a:r>
+              <a:rPr lang="en-US" dirty="0" err="1"/>
+              <a:t>Schmo</a:t>
+            </a:r>
+            <a:r>
+              <a:rPr lang="en-US" dirty="0"/>
+              <a:t>" =&gt; { number: 12, position: "center", </a:t>
+            </a:r>
+            <a:endParaRPr lang="en-US" dirty="0" smtClean="0"/>
+          </a:p>
+          <a:p>
+            <a:r>
+              <a:rPr lang="en-US" dirty="0" smtClean="0"/>
+              <a:t>								"</a:t>
+            </a:r>
+            <a:r>
+              <a:rPr lang="en-US" dirty="0"/>
+              <a:t>points per game" =&gt; [14,32,7,0,23]}</a:t>
+            </a:r>
+            <a:r>
+              <a:rPr lang="en-US" dirty="0" smtClean="0"/>
+              <a:t>,</a:t>
+            </a:r>
+          </a:p>
+          <a:p>
+            <a:endParaRPr lang="en-US" dirty="0"/>
+          </a:p>
+          <a:p>
+            <a:r>
+              <a:rPr lang="en-US" dirty="0"/>
+              <a:t>             </a:t>
+            </a:r>
+            <a:r>
+              <a:rPr lang="en-US" dirty="0" smtClean="0"/>
+              <a:t>"</a:t>
+            </a:r>
+            <a:r>
+              <a:rPr lang="en-US" dirty="0"/>
+              <a:t>Ms. Buckets" =&gt; { number: 9, position: "Point Guard", </a:t>
+            </a:r>
+            <a:r>
+              <a:rPr lang="en-US" dirty="0" smtClean="0"/>
+              <a:t>								"</a:t>
+            </a:r>
+            <a:r>
+              <a:rPr lang="en-US" dirty="0"/>
+              <a:t>points per game" =&gt; [19,0,11,22,0]}</a:t>
+            </a:r>
+            <a:r>
+              <a:rPr lang="en-US" dirty="0" smtClean="0"/>
+              <a:t>,</a:t>
+            </a:r>
+          </a:p>
+          <a:p>
+            <a:endParaRPr lang="en-US" dirty="0"/>
+          </a:p>
+          <a:p>
+            <a:r>
+              <a:rPr lang="en-US" dirty="0"/>
+              <a:t>             </a:t>
+            </a:r>
+            <a:r>
+              <a:rPr lang="en-US" dirty="0" smtClean="0"/>
+              <a:t>"</a:t>
+            </a:r>
+            <a:r>
+              <a:rPr lang="en-US" dirty="0"/>
+              <a:t>Harvey Kay" =&gt; {number: 31, position: "Shooting Guard", </a:t>
+            </a:r>
+            <a:r>
+              <a:rPr lang="en-US" dirty="0" smtClean="0"/>
+              <a:t>								"</a:t>
+            </a:r>
+            <a:r>
+              <a:rPr lang="en-US" dirty="0"/>
+              <a:t>points per game" =&gt; [0,30,16,0,25]}</a:t>
+            </a:r>
+            <a:r>
+              <a:rPr lang="en-US" dirty="0" smtClean="0"/>
+              <a:t>,</a:t>
+            </a:r>
+          </a:p>
+          <a:p>
+            <a:endParaRPr lang="en-US" dirty="0"/>
+          </a:p>
+          <a:p>
+            <a:r>
+              <a:rPr lang="en-US" dirty="0"/>
+              <a:t>             </a:t>
+            </a:r>
+            <a:r>
+              <a:rPr lang="en-US" dirty="0" smtClean="0"/>
+              <a:t>"</a:t>
+            </a:r>
+            <a:r>
+              <a:rPr lang="en-US" dirty="0"/>
+              <a:t>Sally </a:t>
+            </a:r>
+            <a:r>
+              <a:rPr lang="en-US" dirty="0" err="1"/>
+              <a:t>Talls</a:t>
+            </a:r>
+            <a:r>
+              <a:rPr lang="en-US" dirty="0"/>
+              <a:t>" =&gt; {number: 18, position: "Power Forward", </a:t>
+            </a:r>
+            <a:r>
+              <a:rPr lang="en-US" dirty="0" smtClean="0"/>
+              <a:t>								"</a:t>
+            </a:r>
+            <a:r>
+              <a:rPr lang="en-US" dirty="0"/>
+              <a:t>points per game" =&gt; [18,29,26,31,19]}</a:t>
+            </a:r>
+            <a:r>
+              <a:rPr lang="en-US" dirty="0" smtClean="0"/>
+              <a:t>,</a:t>
+            </a:r>
+          </a:p>
+          <a:p>
+            <a:endParaRPr lang="en-US" dirty="0"/>
+          </a:p>
+          <a:p>
+            <a:r>
+              <a:rPr lang="en-US" dirty="0"/>
+              <a:t>             </a:t>
+            </a:r>
+            <a:r>
+              <a:rPr lang="en-US" dirty="0" smtClean="0"/>
+              <a:t>"</a:t>
+            </a:r>
+            <a:r>
+              <a:rPr lang="en-US" dirty="0"/>
+              <a:t>MK </a:t>
+            </a:r>
+            <a:r>
+              <a:rPr lang="en-US" dirty="0" err="1"/>
+              <a:t>DiBoux</a:t>
+            </a:r>
+            <a:r>
+              <a:rPr lang="en-US" dirty="0"/>
+              <a:t>" =&gt; {number: 22, position: "Small Forward", </a:t>
+            </a:r>
+            <a:r>
+              <a:rPr lang="en-US" dirty="0" smtClean="0"/>
+              <a:t>								"</a:t>
+            </a:r>
+            <a:r>
+              <a:rPr lang="en-US" dirty="0"/>
+              <a:t>points per game" =&gt; [11,0,23,17,0]}</a:t>
+            </a:r>
+          </a:p>
+          <a:p>
+            <a:r>
+              <a:rPr lang="en-US" dirty="0"/>
+              <a:t>            }</a:t>
+            </a:r>
+            <a:endParaRPr lang="en-US" dirty="0" smtClean="0"/>
           </a:p>
         </p:txBody>
       </p:sp>
@@ -16072,229 +16471,10 @@
           </a:p>
         </p:txBody>
       </p:sp>
-      <p:sp>
-        <p:nvSpPr>
-          <p:cNvPr id="5" name="Content Placeholder 2"/>
-          <p:cNvSpPr txBox="1">
-            <a:spLocks/>
-          </p:cNvSpPr>
-          <p:nvPr/>
-        </p:nvSpPr>
-        <p:spPr>
-          <a:xfrm>
-            <a:off x="457200" y="2981540"/>
-            <a:ext cx="8229600" cy="2758860"/>
-          </a:xfrm>
-          <a:prstGeom prst="rect">
-            <a:avLst/>
-          </a:prstGeom>
-        </p:spPr>
-        <p:txBody>
-          <a:bodyPr vert="horz" lIns="91440" tIns="45720" rIns="91440" bIns="45720" rtlCol="0">
-            <a:normAutofit/>
-          </a:bodyPr>
-          <a:lstStyle>
-            <a:lvl1pPr marL="342900" indent="-342900" algn="l" defTabSz="457200" rtl="0" eaLnBrk="1" latinLnBrk="0" hangingPunct="1">
-              <a:spcBef>
-                <a:spcPct val="20000"/>
-              </a:spcBef>
-              <a:buFont typeface="Arial"/>
-              <a:buChar char="•"/>
-              <a:defRPr sz="3200" kern="1200">
-                <a:solidFill>
-                  <a:schemeClr val="accent2"/>
-                </a:solidFill>
-                <a:latin typeface="+mn-lt"/>
-                <a:ea typeface="+mn-ea"/>
-                <a:cs typeface="+mn-cs"/>
-              </a:defRPr>
-            </a:lvl1pPr>
-            <a:lvl2pPr marL="742950" indent="-285750" algn="l" defTabSz="457200" rtl="0" eaLnBrk="1" latinLnBrk="0" hangingPunct="1">
-              <a:spcBef>
-                <a:spcPct val="20000"/>
-              </a:spcBef>
-              <a:buFont typeface="Arial"/>
-              <a:buChar char="•"/>
-              <a:defRPr sz="2800" kern="1200">
-                <a:solidFill>
-                  <a:schemeClr val="accent3"/>
-                </a:solidFill>
-                <a:latin typeface="+mn-lt"/>
-                <a:ea typeface="+mn-ea"/>
-                <a:cs typeface="+mn-cs"/>
-              </a:defRPr>
-            </a:lvl2pPr>
-            <a:lvl3pPr marL="1143000" indent="-228600" algn="l" defTabSz="457200" rtl="0" eaLnBrk="1" latinLnBrk="0" hangingPunct="1">
-              <a:spcBef>
-                <a:spcPct val="20000"/>
-              </a:spcBef>
-              <a:buFont typeface="Arial"/>
-              <a:buChar char="•"/>
-              <a:defRPr sz="2400" kern="1200">
-                <a:solidFill>
-                  <a:schemeClr val="accent3"/>
-                </a:solidFill>
-                <a:latin typeface="+mn-lt"/>
-                <a:ea typeface="+mn-ea"/>
-                <a:cs typeface="+mn-cs"/>
-              </a:defRPr>
-            </a:lvl3pPr>
-            <a:lvl4pPr marL="1600200" indent="-228600" algn="l" defTabSz="457200" rtl="0" eaLnBrk="1" latinLnBrk="0" hangingPunct="1">
-              <a:spcBef>
-                <a:spcPct val="20000"/>
-              </a:spcBef>
-              <a:buFont typeface="Arial"/>
-              <a:buChar char="•"/>
-              <a:defRPr sz="2000" kern="1200">
-                <a:solidFill>
-                  <a:schemeClr val="accent3"/>
-                </a:solidFill>
-                <a:latin typeface="+mn-lt"/>
-                <a:ea typeface="+mn-ea"/>
-                <a:cs typeface="+mn-cs"/>
-              </a:defRPr>
-            </a:lvl4pPr>
-            <a:lvl5pPr marL="2057400" indent="-228600" algn="l" defTabSz="457200" rtl="0" eaLnBrk="1" latinLnBrk="0" hangingPunct="1">
-              <a:spcBef>
-                <a:spcPct val="20000"/>
-              </a:spcBef>
-              <a:buFont typeface="Arial"/>
-              <a:buChar char="•"/>
-              <a:defRPr sz="2000" kern="1200">
-                <a:solidFill>
-                  <a:schemeClr val="accent3"/>
-                </a:solidFill>
-                <a:latin typeface="+mn-lt"/>
-                <a:ea typeface="+mn-ea"/>
-                <a:cs typeface="+mn-cs"/>
-              </a:defRPr>
-            </a:lvl5pPr>
-            <a:lvl6pPr marL="2514600" indent="-228600" algn="l" defTabSz="457200" rtl="0" eaLnBrk="1" latinLnBrk="0" hangingPunct="1">
-              <a:spcBef>
-                <a:spcPct val="20000"/>
-              </a:spcBef>
-              <a:buFont typeface="Arial"/>
-              <a:buChar char="•"/>
-              <a:defRPr sz="2000" kern="1200">
-                <a:solidFill>
-                  <a:schemeClr val="tx1"/>
-                </a:solidFill>
-                <a:latin typeface="+mn-lt"/>
-                <a:ea typeface="+mn-ea"/>
-                <a:cs typeface="+mn-cs"/>
-              </a:defRPr>
-            </a:lvl6pPr>
-            <a:lvl7pPr marL="2971800" indent="-228600" algn="l" defTabSz="457200" rtl="0" eaLnBrk="1" latinLnBrk="0" hangingPunct="1">
-              <a:spcBef>
-                <a:spcPct val="20000"/>
-              </a:spcBef>
-              <a:buFont typeface="Arial"/>
-              <a:buChar char="•"/>
-              <a:defRPr sz="2000" kern="1200">
-                <a:solidFill>
-                  <a:schemeClr val="tx1"/>
-                </a:solidFill>
-                <a:latin typeface="+mn-lt"/>
-                <a:ea typeface="+mn-ea"/>
-                <a:cs typeface="+mn-cs"/>
-              </a:defRPr>
-            </a:lvl7pPr>
-            <a:lvl8pPr marL="3429000" indent="-228600" algn="l" defTabSz="457200" rtl="0" eaLnBrk="1" latinLnBrk="0" hangingPunct="1">
-              <a:spcBef>
-                <a:spcPct val="20000"/>
-              </a:spcBef>
-              <a:buFont typeface="Arial"/>
-              <a:buChar char="•"/>
-              <a:defRPr sz="2000" kern="1200">
-                <a:solidFill>
-                  <a:schemeClr val="tx1"/>
-                </a:solidFill>
-                <a:latin typeface="+mn-lt"/>
-                <a:ea typeface="+mn-ea"/>
-                <a:cs typeface="+mn-cs"/>
-              </a:defRPr>
-            </a:lvl8pPr>
-            <a:lvl9pPr marL="3886200" indent="-228600" algn="l" defTabSz="457200" rtl="0" eaLnBrk="1" latinLnBrk="0" hangingPunct="1">
-              <a:spcBef>
-                <a:spcPct val="20000"/>
-              </a:spcBef>
-              <a:buFont typeface="Arial"/>
-              <a:buChar char="•"/>
-              <a:defRPr sz="2000" kern="1200">
-                <a:solidFill>
-                  <a:schemeClr val="tx1"/>
-                </a:solidFill>
-                <a:latin typeface="+mn-lt"/>
-                <a:ea typeface="+mn-ea"/>
-                <a:cs typeface="+mn-cs"/>
-              </a:defRPr>
-            </a:lvl9pPr>
-          </a:lstStyle>
-          <a:p>
-            <a:pPr marL="0" indent="0">
-              <a:buNone/>
-            </a:pPr>
-            <a:r>
-              <a:rPr lang="en-US" sz="1500" dirty="0">
-                <a:latin typeface="Andale Mono"/>
-                <a:cs typeface="Andale Mono"/>
-              </a:rPr>
-              <a:t>team[2][0]</a:t>
-            </a:r>
-            <a:br>
-              <a:rPr lang="en-US" sz="1500" dirty="0">
-                <a:latin typeface="Andale Mono"/>
-                <a:cs typeface="Andale Mono"/>
-              </a:rPr>
-            </a:br>
-            <a:r>
-              <a:rPr lang="en-US" sz="1500" dirty="0" smtClean="0">
-                <a:latin typeface="Andale Mono"/>
-                <a:cs typeface="Andale Mono"/>
-              </a:rPr>
-              <a:t>team</a:t>
-            </a:r>
-            <a:r>
-              <a:rPr lang="en-US" sz="1500" dirty="0">
-                <a:latin typeface="Andale Mono"/>
-                <a:cs typeface="Andale Mono"/>
-              </a:rPr>
-              <a:t>[5][3][0</a:t>
-            </a:r>
-            <a:r>
-              <a:rPr lang="en-US" sz="1500" dirty="0" smtClean="0">
-                <a:latin typeface="Andale Mono"/>
-                <a:cs typeface="Andale Mono"/>
-              </a:rPr>
-              <a:t>]</a:t>
-            </a:r>
-            <a:r>
-              <a:rPr lang="en-US" sz="1500" dirty="0">
-                <a:latin typeface="Andale Mono"/>
-                <a:cs typeface="Andale Mono"/>
-              </a:rPr>
-              <a:t/>
-            </a:r>
-            <a:br>
-              <a:rPr lang="en-US" sz="1500" dirty="0">
-                <a:latin typeface="Andale Mono"/>
-                <a:cs typeface="Andale Mono"/>
-              </a:rPr>
-            </a:br>
-            <a:r>
-              <a:rPr lang="en-US" sz="1500" dirty="0">
-                <a:latin typeface="Andale Mono"/>
-                <a:cs typeface="Andale Mono"/>
-              </a:rPr>
-              <a:t>team[3][2]</a:t>
-            </a:r>
-          </a:p>
-        </p:txBody>
-      </p:sp>
     </p:spTree>
     <p:extLst>
       <p:ext uri="{BB962C8B-B14F-4D97-AF65-F5344CB8AC3E}">
-        <p14:creationId xmlns:p14="http://schemas.microsoft.com/office/powerpoint/2010/main" val="2094196939"/>
+        <p14:creationId xmlns:p14="http://schemas.microsoft.com/office/powerpoint/2010/main" val="1459902208"/>
       </p:ext>
     </p:extLst>
   </p:cSld>
@@ -16344,20 +16524,40 @@
           <a:lstStyle/>
           <a:p>
             <a:r>
-              <a:rPr lang="en-US" dirty="0" smtClean="0"/>
+              <a:rPr lang="en-US" sz="4400" b="1" kern="1200" dirty="0" smtClean="0">
+                <a:solidFill>
+                  <a:schemeClr val="accent1"/>
+                </a:solidFill>
+                <a:effectLst/>
+                <a:latin typeface="+mj-lt"/>
+                <a:ea typeface="+mj-ea"/>
+                <a:cs typeface="+mj-cs"/>
+              </a:rPr>
               <a:t>Hashes Provide</a:t>
             </a:r>
             <a:r>
-              <a:rPr lang="en-US" baseline="0" dirty="0" smtClean="0"/>
+              <a:rPr lang="en-US" sz="4400" b="1" kern="1200" baseline="0" dirty="0" smtClean="0">
+                <a:solidFill>
+                  <a:schemeClr val="accent1"/>
+                </a:solidFill>
+                <a:effectLst/>
+                <a:latin typeface="+mj-lt"/>
+                <a:ea typeface="+mj-ea"/>
+                <a:cs typeface="+mj-cs"/>
+              </a:rPr>
               <a:t> Informative Labels</a:t>
             </a:r>
+            <a:r>
+              <a:rPr lang="en-US" dirty="0" smtClean="0"/>
+              <a:t> </a:t>
+            </a:r>
             <a:endParaRPr lang="en-US" dirty="0"/>
           </a:p>
         </p:txBody>
       </p:sp>
       <p:sp>
         <p:nvSpPr>
-          <p:cNvPr id="5" name="Content Placeholder 4"/>
+          <p:cNvPr id="3" name="Content Placeholder 2"/>
           <p:cNvSpPr>
             <a:spLocks noGrp="1"/>
           </p:cNvSpPr>
@@ -16365,198 +16565,30 @@
             <p:ph idx="1"/>
           </p:nvPr>
         </p:nvSpPr>
-        <p:spPr>
-          <a:xfrm>
-            <a:off x="99216" y="1418725"/>
-            <a:ext cx="9044784" cy="4762156"/>
-          </a:xfrm>
-        </p:spPr>
-        <p:txBody>
-          <a:bodyPr>
-            <a:normAutofit/>
-          </a:bodyPr>
+        <p:spPr/>
+        <p:txBody>
+          <a:bodyPr/>
           <a:lstStyle/>
           <a:p>
             <a:r>
-              <a:rPr lang="en-US" dirty="0" err="1"/>
-              <a:t>hash_team</a:t>
-            </a:r>
-            <a:r>
-              <a:rPr lang="en-US" dirty="0"/>
-              <a:t> = {</a:t>
-            </a:r>
-          </a:p>
-          <a:p>
-            <a:r>
-              <a:rPr lang="en-US" dirty="0"/>
-              <a:t>             </a:t>
-            </a:r>
-            <a:r>
-              <a:rPr lang="en-US" dirty="0" smtClean="0"/>
-              <a:t>"</a:t>
-            </a:r>
-            <a:r>
-              <a:rPr lang="en-US" dirty="0"/>
-              <a:t>Joe </a:t>
-            </a:r>
-            <a:r>
-              <a:rPr lang="en-US" dirty="0" err="1"/>
-              <a:t>Schmo</a:t>
-            </a:r>
-            <a:r>
-              <a:rPr lang="en-US" dirty="0"/>
-              <a:t>" =&gt; { number: 12, position: "center", </a:t>
-            </a:r>
-            <a:endParaRPr lang="en-US" dirty="0" smtClean="0"/>
-          </a:p>
-          <a:p>
-            <a:r>
-              <a:rPr lang="en-US" dirty="0" smtClean="0"/>
-              <a:t>								"</a:t>
-            </a:r>
-            <a:r>
-              <a:rPr lang="en-US" dirty="0"/>
-              <a:t>points per game" =&gt; [14,32,7,0,23]}</a:t>
-            </a:r>
-            <a:r>
-              <a:rPr lang="en-US" dirty="0" smtClean="0"/>
-              <a:t>,</a:t>
-            </a:r>
-          </a:p>
-          <a:p>
-            <a:endParaRPr lang="en-US" dirty="0"/>
-          </a:p>
-          <a:p>
-            <a:r>
-              <a:rPr lang="en-US" dirty="0"/>
-              <a:t>             </a:t>
-            </a:r>
-            <a:r>
-              <a:rPr lang="en-US" dirty="0" smtClean="0"/>
-              <a:t>"</a:t>
-            </a:r>
-            <a:r>
-              <a:rPr lang="en-US" dirty="0"/>
-              <a:t>Ms. Buckets" =&gt; { number: 9, position: "Point Guard", </a:t>
-            </a:r>
-            <a:r>
-              <a:rPr lang="en-US" dirty="0" smtClean="0"/>
-              <a:t>								"</a:t>
-            </a:r>
-            <a:r>
-              <a:rPr lang="en-US" dirty="0"/>
-              <a:t>points per game" =&gt; [19,0,11,22,0]}</a:t>
-            </a:r>
-            <a:r>
-              <a:rPr lang="en-US" dirty="0" smtClean="0"/>
-              <a:t>,</a:t>
-            </a:r>
-          </a:p>
-          <a:p>
-            <a:endParaRPr lang="en-US" dirty="0"/>
-          </a:p>
-          <a:p>
-            <a:r>
-              <a:rPr lang="en-US" dirty="0"/>
-              <a:t>             </a:t>
-            </a:r>
-            <a:r>
-              <a:rPr lang="en-US" dirty="0" smtClean="0"/>
-              <a:t>"</a:t>
-            </a:r>
-            <a:r>
-              <a:rPr lang="en-US" dirty="0"/>
-              <a:t>Harvey Kay" =&gt; {number: 31, position: "Shooting Guard", </a:t>
-            </a:r>
-            <a:r>
-              <a:rPr lang="en-US" dirty="0" smtClean="0"/>
-              <a:t>								"</a:t>
-            </a:r>
-            <a:r>
-              <a:rPr lang="en-US" dirty="0"/>
-              <a:t>points per game" =&gt; [0,30,16,0,25]}</a:t>
-            </a:r>
-            <a:r>
-              <a:rPr lang="en-US" dirty="0" smtClean="0"/>
-              <a:t>,</a:t>
-            </a:r>
-          </a:p>
-          <a:p>
-            <a:endParaRPr lang="en-US" dirty="0"/>
-          </a:p>
-          <a:p>
-            <a:r>
-              <a:rPr lang="en-US" dirty="0"/>
-              <a:t>             </a:t>
-            </a:r>
-            <a:r>
-              <a:rPr lang="en-US" dirty="0" smtClean="0"/>
-              <a:t>"</a:t>
-            </a:r>
-            <a:r>
-              <a:rPr lang="en-US" dirty="0"/>
-              <a:t>Sally </a:t>
-            </a:r>
-            <a:r>
-              <a:rPr lang="en-US" dirty="0" err="1"/>
-              <a:t>Talls</a:t>
-            </a:r>
-            <a:r>
-              <a:rPr lang="en-US" dirty="0"/>
-              <a:t>" =&gt; {number: 18, position: "Power Forward", </a:t>
-            </a:r>
-            <a:r>
-              <a:rPr lang="en-US" dirty="0" smtClean="0"/>
-              <a:t>								"</a:t>
-            </a:r>
-            <a:r>
-              <a:rPr lang="en-US" dirty="0"/>
-              <a:t>points per game" =&gt; [18,29,26,31,19]}</a:t>
-            </a:r>
-            <a:r>
-              <a:rPr lang="en-US" dirty="0" smtClean="0"/>
-              <a:t>,</a:t>
-            </a:r>
-          </a:p>
-          <a:p>
-            <a:endParaRPr lang="en-US" dirty="0"/>
-          </a:p>
-          <a:p>
-            <a:r>
-              <a:rPr lang="en-US" dirty="0"/>
-              <a:t>             </a:t>
-            </a:r>
-            <a:r>
-              <a:rPr lang="en-US" dirty="0" smtClean="0"/>
-              <a:t>"</a:t>
-            </a:r>
-            <a:r>
-              <a:rPr lang="en-US" dirty="0"/>
-              <a:t>MK </a:t>
-            </a:r>
-            <a:r>
-              <a:rPr lang="en-US" dirty="0" err="1"/>
-              <a:t>DiBoux</a:t>
-            </a:r>
-            <a:r>
-              <a:rPr lang="en-US" dirty="0"/>
-              <a:t>" =&gt; {number: 22, position: "Small Forward", </a:t>
-            </a:r>
-            <a:r>
-              <a:rPr lang="en-US" dirty="0" smtClean="0"/>
-              <a:t>								"</a:t>
-            </a:r>
-            <a:r>
-              <a:rPr lang="en-US" dirty="0"/>
-              <a:t>points per game" =&gt; [11,0,23,17,0]}</a:t>
-            </a:r>
-          </a:p>
-          <a:p>
-            <a:r>
-              <a:rPr lang="en-US" dirty="0"/>
-              <a:t>            }</a:t>
-            </a:r>
-            <a:endParaRPr lang="en-US" dirty="0" smtClean="0"/>
+              <a:rPr lang="en-US" dirty="0" smtClean="0"/>
+              <a:t>Which is more comprehensible?</a:t>
+            </a:r>
+            <a:br>
+              <a:rPr lang="en-US" dirty="0" smtClean="0"/>
+            </a:br>
+            <a:r>
+              <a:rPr lang="en-US" baseline="0" dirty="0" smtClean="0"/>
+              <a:t/>
+            </a:r>
+            <a:br>
+              <a:rPr lang="en-US" baseline="0" dirty="0" smtClean="0"/>
+            </a:br>
+            <a:endParaRPr lang="en-US" baseline="0" dirty="0" smtClean="0">
+              <a:solidFill>
+                <a:srgbClr val="7E7F80"/>
+              </a:solidFill>
+            </a:endParaRPr>
           </a:p>
         </p:txBody>
       </p:sp>
@@ -16583,10 +16615,209 @@
           </a:p>
         </p:txBody>
       </p:sp>
+      <p:sp>
+        <p:nvSpPr>
+          <p:cNvPr id="5" name="Content Placeholder 2"/>
+          <p:cNvSpPr txBox="1">
+            <a:spLocks/>
+          </p:cNvSpPr>
+          <p:nvPr/>
+        </p:nvSpPr>
+        <p:spPr>
+          <a:xfrm>
+            <a:off x="457200" y="2981540"/>
+            <a:ext cx="8229600" cy="2758860"/>
+          </a:xfrm>
+          <a:prstGeom prst="rect">
+            <a:avLst/>
+          </a:prstGeom>
+        </p:spPr>
+        <p:txBody>
+          <a:bodyPr vert="horz" lIns="91440" tIns="45720" rIns="91440" bIns="45720" rtlCol="0">
+            <a:normAutofit/>
+          </a:bodyPr>
+          <a:lstStyle>
+            <a:lvl1pPr marL="342900" indent="-342900" algn="l" defTabSz="457200" rtl="0" eaLnBrk="1" latinLnBrk="0" hangingPunct="1">
+              <a:spcBef>
+                <a:spcPct val="20000"/>
+              </a:spcBef>
+              <a:buFont typeface="Arial"/>
+              <a:buChar char="•"/>
+              <a:defRPr sz="3200" kern="1200">
+                <a:solidFill>
+                  <a:schemeClr val="accent2"/>
+                </a:solidFill>
+                <a:latin typeface="+mn-lt"/>
+                <a:ea typeface="+mn-ea"/>
+                <a:cs typeface="+mn-cs"/>
+              </a:defRPr>
+            </a:lvl1pPr>
+            <a:lvl2pPr marL="742950" indent="-285750" algn="l" defTabSz="457200" rtl="0" eaLnBrk="1" latinLnBrk="0" hangingPunct="1">
+              <a:spcBef>
+                <a:spcPct val="20000"/>
+              </a:spcBef>
+              <a:buFont typeface="Arial"/>
+              <a:buChar char="•"/>
+              <a:defRPr sz="2800" kern="1200">
+                <a:solidFill>
+                  <a:schemeClr val="accent3"/>
+                </a:solidFill>
+                <a:latin typeface="+mn-lt"/>
+                <a:ea typeface="+mn-ea"/>
+                <a:cs typeface="+mn-cs"/>
+              </a:defRPr>
+            </a:lvl2pPr>
+            <a:lvl3pPr marL="1143000" indent="-228600" algn="l" defTabSz="457200" rtl="0" eaLnBrk="1" latinLnBrk="0" hangingPunct="1">
+              <a:spcBef>
+                <a:spcPct val="20000"/>
+              </a:spcBef>
+              <a:buFont typeface="Arial"/>
+              <a:buChar char="•"/>
+              <a:defRPr sz="2400" kern="1200">
+                <a:solidFill>
+                  <a:schemeClr val="accent3"/>
+                </a:solidFill>
+                <a:latin typeface="+mn-lt"/>
+                <a:ea typeface="+mn-ea"/>
+                <a:cs typeface="+mn-cs"/>
+              </a:defRPr>
+            </a:lvl3pPr>
+            <a:lvl4pPr marL="1600200" indent="-228600" algn="l" defTabSz="457200" rtl="0" eaLnBrk="1" latinLnBrk="0" hangingPunct="1">
+              <a:spcBef>
+                <a:spcPct val="20000"/>
+              </a:spcBef>
+              <a:buFont typeface="Arial"/>
+              <a:buChar char="•"/>
+              <a:defRPr sz="2000" kern="1200">
+                <a:solidFill>
+                  <a:schemeClr val="accent3"/>
+                </a:solidFill>
+                <a:latin typeface="+mn-lt"/>
+                <a:ea typeface="+mn-ea"/>
+                <a:cs typeface="+mn-cs"/>
+              </a:defRPr>
+            </a:lvl4pPr>
+            <a:lvl5pPr marL="2057400" indent="-228600" algn="l" defTabSz="457200" rtl="0" eaLnBrk="1" latinLnBrk="0" hangingPunct="1">
+              <a:spcBef>
+                <a:spcPct val="20000"/>
+              </a:spcBef>
+              <a:buFont typeface="Arial"/>
+              <a:buChar char="•"/>
+              <a:defRPr sz="2000" kern="1200">
+                <a:solidFill>
+                  <a:schemeClr val="accent3"/>
+                </a:solidFill>
+                <a:latin typeface="+mn-lt"/>
+                <a:ea typeface="+mn-ea"/>
+                <a:cs typeface="+mn-cs"/>
+              </a:defRPr>
+            </a:lvl5pPr>
+            <a:lvl6pPr marL="2514600" indent="-228600" algn="l" defTabSz="457200" rtl="0" eaLnBrk="1" latinLnBrk="0" hangingPunct="1">
+              <a:spcBef>
+                <a:spcPct val="20000"/>
+              </a:spcBef>
+              <a:buFont typeface="Arial"/>
+              <a:buChar char="•"/>
+              <a:defRPr sz="2000" kern="1200">
+                <a:solidFill>
+                  <a:schemeClr val="tx1"/>
+                </a:solidFill>
+                <a:latin typeface="+mn-lt"/>
+                <a:ea typeface="+mn-ea"/>
+                <a:cs typeface="+mn-cs"/>
+              </a:defRPr>
+            </a:lvl6pPr>
+            <a:lvl7pPr marL="2971800" indent="-228600" algn="l" defTabSz="457200" rtl="0" eaLnBrk="1" latinLnBrk="0" hangingPunct="1">
+              <a:spcBef>
+                <a:spcPct val="20000"/>
+              </a:spcBef>
+              <a:buFont typeface="Arial"/>
+              <a:buChar char="•"/>
+              <a:defRPr sz="2000" kern="1200">
+                <a:solidFill>
+                  <a:schemeClr val="tx1"/>
+                </a:solidFill>
+                <a:latin typeface="+mn-lt"/>
+                <a:ea typeface="+mn-ea"/>
+                <a:cs typeface="+mn-cs"/>
+              </a:defRPr>
+            </a:lvl7pPr>
+            <a:lvl8pPr marL="3429000" indent="-228600" algn="l" defTabSz="457200" rtl="0" eaLnBrk="1" latinLnBrk="0" hangingPunct="1">
+              <a:spcBef>
+                <a:spcPct val="20000"/>
+              </a:spcBef>
+              <a:buFont typeface="Arial"/>
+              <a:buChar char="•"/>
+              <a:defRPr sz="2000" kern="1200">
+                <a:solidFill>
+                  <a:schemeClr val="tx1"/>
+                </a:solidFill>
+                <a:latin typeface="+mn-lt"/>
+                <a:ea typeface="+mn-ea"/>
+                <a:cs typeface="+mn-cs"/>
+              </a:defRPr>
+            </a:lvl8pPr>
+            <a:lvl9pPr marL="3886200" indent="-228600" algn="l" defTabSz="457200" rtl="0" eaLnBrk="1" latinLnBrk="0" hangingPunct="1">
+              <a:spcBef>
+                <a:spcPct val="20000"/>
+              </a:spcBef>
+              <a:buFont typeface="Arial"/>
+              <a:buChar char="•"/>
+              <a:defRPr sz="2000" kern="1200">
+                <a:solidFill>
+                  <a:schemeClr val="tx1"/>
+                </a:solidFill>
+                <a:latin typeface="+mn-lt"/>
+                <a:ea typeface="+mn-ea"/>
+                <a:cs typeface="+mn-cs"/>
+              </a:defRPr>
+            </a:lvl9pPr>
+          </a:lstStyle>
+          <a:p>
+            <a:pPr marL="0" indent="0">
+              <a:buNone/>
+            </a:pPr>
+            <a:r>
+              <a:rPr lang="en-US" sz="1500" dirty="0">
+                <a:latin typeface="Andale Mono"/>
+                <a:cs typeface="Andale Mono"/>
+              </a:rPr>
+              <a:t>team[2][0</a:t>
+            </a:r>
+            <a:r>
+              <a:rPr lang="en-US" sz="1500" dirty="0" smtClean="0">
+                <a:latin typeface="Andale Mono"/>
+                <a:cs typeface="Andale Mono"/>
+              </a:rPr>
+              <a:t>]</a:t>
+            </a:r>
+            <a:r>
+              <a:rPr lang="en-US" sz="1500" dirty="0">
+                <a:latin typeface="Andale Mono"/>
+                <a:cs typeface="Andale Mono"/>
+              </a:rPr>
+              <a:t/>
+            </a:r>
+            <a:br>
+              <a:rPr lang="en-US" sz="1500" dirty="0">
+                <a:latin typeface="Andale Mono"/>
+                <a:cs typeface="Andale Mono"/>
+              </a:rPr>
+            </a:br>
+            <a:r>
+              <a:rPr lang="en-US" sz="1500" dirty="0">
+                <a:latin typeface="Andale Mono"/>
+                <a:cs typeface="Andale Mono"/>
+              </a:rPr>
+              <a:t>team[“Ms. Buckets”][“number”]</a:t>
+            </a:r>
+          </a:p>
+        </p:txBody>
+      </p:sp>
     </p:spTree>
     <p:extLst>
       <p:ext uri="{BB962C8B-B14F-4D97-AF65-F5344CB8AC3E}">
-        <p14:creationId xmlns:p14="http://schemas.microsoft.com/office/powerpoint/2010/main" val="1459902208"/>
+        <p14:creationId xmlns:p14="http://schemas.microsoft.com/office/powerpoint/2010/main" val="4010579438"/>
       </p:ext>
     </p:extLst>
   </p:cSld>
@@ -16632,349 +16863,6 @@
         </p:nvSpPr>
         <p:spPr/>
         <p:txBody>
-          <a:bodyPr/>
-          <a:lstStyle/>
-          <a:p>
-            <a:r>
-              <a:rPr lang="en-US" sz="4400" b="1" kern="1200" dirty="0" smtClean="0">
-                <a:solidFill>
-                  <a:schemeClr val="accent1"/>
-                </a:solidFill>
-                <a:effectLst/>
-                <a:latin typeface="+mj-lt"/>
-                <a:ea typeface="+mj-ea"/>
-                <a:cs typeface="+mj-cs"/>
-              </a:rPr>
-              <a:t>Hashes Provide</a:t>
-            </a:r>
-            <a:r>
-              <a:rPr lang="en-US" sz="4400" b="1" kern="1200" baseline="0" dirty="0" smtClean="0">
-                <a:solidFill>
-                  <a:schemeClr val="accent1"/>
-                </a:solidFill>
-                <a:effectLst/>
-                <a:latin typeface="+mj-lt"/>
-                <a:ea typeface="+mj-ea"/>
-                <a:cs typeface="+mj-cs"/>
-              </a:rPr>
-              <a:t> Informative Labels</a:t>
-            </a:r>
-            <a:r>
-              <a:rPr lang="en-US" dirty="0" smtClean="0"/>
-              <a:t> </a:t>
-            </a:r>
-            <a:endParaRPr lang="en-US" dirty="0"/>
-          </a:p>
-        </p:txBody>
-      </p:sp>
-      <p:sp>
-        <p:nvSpPr>
-          <p:cNvPr id="3" name="Content Placeholder 2"/>
-          <p:cNvSpPr>
-            <a:spLocks noGrp="1"/>
-          </p:cNvSpPr>
-          <p:nvPr>
-            <p:ph idx="1"/>
-          </p:nvPr>
-        </p:nvSpPr>
-        <p:spPr/>
-        <p:txBody>
-          <a:bodyPr/>
-          <a:lstStyle/>
-          <a:p>
-            <a:r>
-              <a:rPr lang="en-US" dirty="0" smtClean="0"/>
-              <a:t>Which is more comprehensible?</a:t>
-            </a:r>
-            <a:br>
-              <a:rPr lang="en-US" dirty="0" smtClean="0"/>
-            </a:br>
-            <a:r>
-              <a:rPr lang="en-US" baseline="0" dirty="0" smtClean="0"/>
-              <a:t/>
-            </a:r>
-            <a:br>
-              <a:rPr lang="en-US" baseline="0" dirty="0" smtClean="0"/>
-            </a:br>
-            <a:endParaRPr lang="en-US" baseline="0" dirty="0" smtClean="0">
-              <a:solidFill>
-                <a:srgbClr val="7E7F80"/>
-              </a:solidFill>
-            </a:endParaRPr>
-          </a:p>
-        </p:txBody>
-      </p:sp>
-      <p:sp>
-        <p:nvSpPr>
-          <p:cNvPr id="4" name="Footer Placeholder 3"/>
-          <p:cNvSpPr>
-            <a:spLocks noGrp="1"/>
-          </p:cNvSpPr>
-          <p:nvPr>
-            <p:ph type="ftr" sz="quarter" idx="3"/>
-          </p:nvPr>
-        </p:nvSpPr>
-        <p:spPr/>
-        <p:txBody>
-          <a:bodyPr/>
-          <a:lstStyle/>
-          <a:p>
-            <a:r>
-              <a:rPr lang="en-US" smtClean="0"/>
-              <a:t>Nested Data Structures: Arrays and Hashes</a:t>
-            </a:r>
-            <a:endParaRPr lang="en-US" dirty="0"/>
-          </a:p>
-        </p:txBody>
-      </p:sp>
-      <p:sp>
-        <p:nvSpPr>
-          <p:cNvPr id="5" name="Content Placeholder 2"/>
-          <p:cNvSpPr txBox="1">
-            <a:spLocks/>
-          </p:cNvSpPr>
-          <p:nvPr/>
-        </p:nvSpPr>
-        <p:spPr>
-          <a:xfrm>
-            <a:off x="457200" y="2981540"/>
-            <a:ext cx="8229600" cy="2758860"/>
-          </a:xfrm>
-          <a:prstGeom prst="rect">
-            <a:avLst/>
-          </a:prstGeom>
-        </p:spPr>
-        <p:txBody>
-          <a:bodyPr vert="horz" lIns="91440" tIns="45720" rIns="91440" bIns="45720" rtlCol="0">
-            <a:normAutofit/>
-          </a:bodyPr>
-          <a:lstStyle>
-            <a:lvl1pPr marL="342900" indent="-342900" algn="l" defTabSz="457200" rtl="0" eaLnBrk="1" latinLnBrk="0" hangingPunct="1">
-              <a:spcBef>
-                <a:spcPct val="20000"/>
-              </a:spcBef>
-              <a:buFont typeface="Arial"/>
-              <a:buChar char="•"/>
-              <a:defRPr sz="3200" kern="1200">
-                <a:solidFill>
-                  <a:schemeClr val="accent2"/>
-                </a:solidFill>
-                <a:latin typeface="+mn-lt"/>
-                <a:ea typeface="+mn-ea"/>
-                <a:cs typeface="+mn-cs"/>
-              </a:defRPr>
-            </a:lvl1pPr>
-            <a:lvl2pPr marL="742950" indent="-285750" algn="l" defTabSz="457200" rtl="0" eaLnBrk="1" latinLnBrk="0" hangingPunct="1">
-              <a:spcBef>
-                <a:spcPct val="20000"/>
-              </a:spcBef>
-              <a:buFont typeface="Arial"/>
-              <a:buChar char="•"/>
-              <a:defRPr sz="2800" kern="1200">
-                <a:solidFill>
-                  <a:schemeClr val="accent3"/>
-                </a:solidFill>
-                <a:latin typeface="+mn-lt"/>
-                <a:ea typeface="+mn-ea"/>
-                <a:cs typeface="+mn-cs"/>
-              </a:defRPr>
-            </a:lvl2pPr>
-            <a:lvl3pPr marL="1143000" indent="-228600" algn="l" defTabSz="457200" rtl="0" eaLnBrk="1" latinLnBrk="0" hangingPunct="1">
-              <a:spcBef>
-                <a:spcPct val="20000"/>
-              </a:spcBef>
-              <a:buFont typeface="Arial"/>
-              <a:buChar char="•"/>
-              <a:defRPr sz="2400" kern="1200">
-                <a:solidFill>
-                  <a:schemeClr val="accent3"/>
-                </a:solidFill>
-                <a:latin typeface="+mn-lt"/>
-                <a:ea typeface="+mn-ea"/>
-                <a:cs typeface="+mn-cs"/>
-              </a:defRPr>
-            </a:lvl3pPr>
-            <a:lvl4pPr marL="1600200" indent="-228600" algn="l" defTabSz="457200" rtl="0" eaLnBrk="1" latinLnBrk="0" hangingPunct="1">
-              <a:spcBef>
-                <a:spcPct val="20000"/>
-              </a:spcBef>
-              <a:buFont typeface="Arial"/>
-              <a:buChar char="•"/>
-              <a:defRPr sz="2000" kern="1200">
-                <a:solidFill>
-                  <a:schemeClr val="accent3"/>
-                </a:solidFill>
-                <a:latin typeface="+mn-lt"/>
-                <a:ea typeface="+mn-ea"/>
-                <a:cs typeface="+mn-cs"/>
-              </a:defRPr>
-            </a:lvl4pPr>
-            <a:lvl5pPr marL="2057400" indent="-228600" algn="l" defTabSz="457200" rtl="0" eaLnBrk="1" latinLnBrk="0" hangingPunct="1">
-              <a:spcBef>
-                <a:spcPct val="20000"/>
-              </a:spcBef>
-              <a:buFont typeface="Arial"/>
-              <a:buChar char="•"/>
-              <a:defRPr sz="2000" kern="1200">
-                <a:solidFill>
-                  <a:schemeClr val="accent3"/>
-                </a:solidFill>
-                <a:latin typeface="+mn-lt"/>
-                <a:ea typeface="+mn-ea"/>
-                <a:cs typeface="+mn-cs"/>
-              </a:defRPr>
-            </a:lvl5pPr>
-            <a:lvl6pPr marL="2514600" indent="-228600" algn="l" defTabSz="457200" rtl="0" eaLnBrk="1" latinLnBrk="0" hangingPunct="1">
-              <a:spcBef>
-                <a:spcPct val="20000"/>
-              </a:spcBef>
-              <a:buFont typeface="Arial"/>
-              <a:buChar char="•"/>
-              <a:defRPr sz="2000" kern="1200">
-                <a:solidFill>
-                  <a:schemeClr val="tx1"/>
-                </a:solidFill>
-                <a:latin typeface="+mn-lt"/>
-                <a:ea typeface="+mn-ea"/>
-                <a:cs typeface="+mn-cs"/>
-              </a:defRPr>
-            </a:lvl6pPr>
-            <a:lvl7pPr marL="2971800" indent="-228600" algn="l" defTabSz="457200" rtl="0" eaLnBrk="1" latinLnBrk="0" hangingPunct="1">
-              <a:spcBef>
-                <a:spcPct val="20000"/>
-              </a:spcBef>
-              <a:buFont typeface="Arial"/>
-              <a:buChar char="•"/>
-              <a:defRPr sz="2000" kern="1200">
-                <a:solidFill>
-                  <a:schemeClr val="tx1"/>
-                </a:solidFill>
-                <a:latin typeface="+mn-lt"/>
-                <a:ea typeface="+mn-ea"/>
-                <a:cs typeface="+mn-cs"/>
-              </a:defRPr>
-            </a:lvl7pPr>
-            <a:lvl8pPr marL="3429000" indent="-228600" algn="l" defTabSz="457200" rtl="0" eaLnBrk="1" latinLnBrk="0" hangingPunct="1">
-              <a:spcBef>
-                <a:spcPct val="20000"/>
-              </a:spcBef>
-              <a:buFont typeface="Arial"/>
-              <a:buChar char="•"/>
-              <a:defRPr sz="2000" kern="1200">
-                <a:solidFill>
-                  <a:schemeClr val="tx1"/>
-                </a:solidFill>
-                <a:latin typeface="+mn-lt"/>
-                <a:ea typeface="+mn-ea"/>
-                <a:cs typeface="+mn-cs"/>
-              </a:defRPr>
-            </a:lvl8pPr>
-            <a:lvl9pPr marL="3886200" indent="-228600" algn="l" defTabSz="457200" rtl="0" eaLnBrk="1" latinLnBrk="0" hangingPunct="1">
-              <a:spcBef>
-                <a:spcPct val="20000"/>
-              </a:spcBef>
-              <a:buFont typeface="Arial"/>
-              <a:buChar char="•"/>
-              <a:defRPr sz="2000" kern="1200">
-                <a:solidFill>
-                  <a:schemeClr val="tx1"/>
-                </a:solidFill>
-                <a:latin typeface="+mn-lt"/>
-                <a:ea typeface="+mn-ea"/>
-                <a:cs typeface="+mn-cs"/>
-              </a:defRPr>
-            </a:lvl9pPr>
-          </a:lstStyle>
-          <a:p>
-            <a:pPr marL="0" indent="0">
-              <a:buNone/>
-            </a:pPr>
-            <a:r>
-              <a:rPr lang="en-US" sz="1500" dirty="0">
-                <a:latin typeface="Andale Mono"/>
-                <a:cs typeface="Andale Mono"/>
-              </a:rPr>
-              <a:t>team[2][0</a:t>
-            </a:r>
-            <a:r>
-              <a:rPr lang="en-US" sz="1500" dirty="0" smtClean="0">
-                <a:latin typeface="Andale Mono"/>
-                <a:cs typeface="Andale Mono"/>
-              </a:rPr>
-              <a:t>]</a:t>
-            </a:r>
-            <a:r>
-              <a:rPr lang="en-US" sz="1500" dirty="0">
-                <a:latin typeface="Andale Mono"/>
-                <a:cs typeface="Andale Mono"/>
-              </a:rPr>
-              <a:t/>
-            </a:r>
-            <a:br>
-              <a:rPr lang="en-US" sz="1500" dirty="0">
-                <a:latin typeface="Andale Mono"/>
-                <a:cs typeface="Andale Mono"/>
-              </a:rPr>
-            </a:br>
-            <a:r>
-              <a:rPr lang="en-US" sz="1500" dirty="0">
-                <a:latin typeface="Andale Mono"/>
-                <a:cs typeface="Andale Mono"/>
-              </a:rPr>
-              <a:t>team[“Ms. Buckets”][“number”]</a:t>
-            </a:r>
-          </a:p>
-        </p:txBody>
-      </p:sp>
-    </p:spTree>
-    <p:extLst>
-      <p:ext uri="{BB962C8B-B14F-4D97-AF65-F5344CB8AC3E}">
-        <p14:creationId xmlns:p14="http://schemas.microsoft.com/office/powerpoint/2010/main" val="4010579438"/>
-      </p:ext>
-    </p:extLst>
-  </p:cSld>
-  <p:clrMapOvr>
-    <a:masterClrMapping/>
-  </p:clrMapOvr>
-  <p:timing>
-    <p:tnLst>
-      <p:par>
-        <p:cTn xmlns:p14="http://schemas.microsoft.com/office/powerpoint/2010/main" id="1" dur="indefinite" restart="never" nodeType="tmRoot"/>
-      </p:par>
-    </p:tnLst>
-  </p:timing>
-</p:sld>
-</file>
-
-<file path=ppt/slides/slide55.xml><?xml version="1.0" encoding="utf-8"?>
-<p:sld xmlns:a="http://schemas.openxmlformats.org/drawingml/2006/main" xmlns:r="http://schemas.openxmlformats.org/officeDocument/2006/relationships" xmlns:p="http://schemas.openxmlformats.org/presentationml/2006/main">
-  <p:cSld>
-    <p:spTree>
-      <p:nvGrpSpPr>
-        <p:cNvPr id="1" name=""/>
-        <p:cNvGrpSpPr/>
-        <p:nvPr/>
-      </p:nvGrpSpPr>
-      <p:grpSpPr>
-        <a:xfrm>
-          <a:off x="0" y="0"/>
-          <a:ext cx="0" cy="0"/>
-          <a:chOff x="0" y="0"/>
-          <a:chExt cx="0" cy="0"/>
-        </a:xfrm>
-      </p:grpSpPr>
-      <p:sp>
-        <p:nvSpPr>
-          <p:cNvPr id="2" name="Title 1"/>
-          <p:cNvSpPr>
-            <a:spLocks noGrp="1"/>
-          </p:cNvSpPr>
-          <p:nvPr>
-            <p:ph type="title"/>
-          </p:nvPr>
-        </p:nvSpPr>
-        <p:spPr/>
-        <p:txBody>
           <a:bodyPr>
             <a:normAutofit fontScale="90000"/>
           </a:bodyPr>
@@ -16982,7 +16870,26 @@
           <a:p>
             <a:r>
               <a:rPr lang="en-US" dirty="0" smtClean="0"/>
-              <a:t>Optimal Solution – Array of Hashes </a:t>
+              <a:t>Optimal Solution </a:t>
+            </a:r>
+            <a:r>
+              <a:rPr lang="en-US" dirty="0" smtClean="0"/>
+              <a:t>Maybe </a:t>
+            </a:r>
+            <a:br>
+              <a:rPr lang="en-US" dirty="0" smtClean="0"/>
+            </a:br>
+            <a:r>
+              <a:rPr lang="en-US" dirty="0" smtClean="0"/>
+              <a:t>An</a:t>
+            </a:r>
+            <a:r>
+              <a:rPr lang="en-US" dirty="0" smtClean="0"/>
+              <a:t> </a:t>
+            </a:r>
+            <a:r>
+              <a:rPr lang="en-US" dirty="0" smtClean="0"/>
+              <a:t>Array of Hashes </a:t>
             </a:r>
             <a:endParaRPr lang="en-US" dirty="0"/>
           </a:p>
@@ -17249,7 +17156,7 @@
 </p:sld>
 </file>
 
-<file path=ppt/slides/slide56.xml><?xml version="1.0" encoding="utf-8"?>
+<file path=ppt/slides/slide55.xml><?xml version="1.0" encoding="utf-8"?>
 <p:sld xmlns:a="http://schemas.openxmlformats.org/drawingml/2006/main" xmlns:r="http://schemas.openxmlformats.org/officeDocument/2006/relationships" xmlns:p="http://schemas.openxmlformats.org/presentationml/2006/main">
   <p:cSld>
     <p:spTree>

</xml_diff>

<commit_message>
update slides - pdf
</commit_message>
<xml_diff>
--- a/1phase/data-stucts/HTC-nested-data-structures.pptx
+++ b/1phase/data-stucts/HTC-nested-data-structures.pptx
@@ -249,7 +249,7 @@
           <a:p>
             <a:fld id="{CAA47771-BE1A-0F41-A2AB-502D986D5C71}" type="datetimeFigureOut">
               <a:rPr lang="en-US" smtClean="0"/>
-              <a:t>9/9/15</a:t>
+              <a:t>10/22/15</a:t>
             </a:fld>
             <a:endParaRPr lang="en-US"/>
           </a:p>
@@ -415,7 +415,7 @@
           <a:p>
             <a:fld id="{4083CDE4-3FA1-6A4B-862D-E61F193A4941}" type="datetimeFigureOut">
               <a:rPr lang="en-US" smtClean="0"/>
-              <a:t>9/9/15</a:t>
+              <a:t>10/22/15</a:t>
             </a:fld>
             <a:endParaRPr lang="en-US"/>
           </a:p>
@@ -2323,7 +2323,15 @@
           <a:p>
             <a:r>
               <a:rPr lang="en-US" dirty="0" smtClean="0"/>
-              <a:t>How do we dive into these structures?</a:t>
+              <a:t>How do we </a:t>
+            </a:r>
+            <a:r>
+              <a:rPr lang="en-US" dirty="0" smtClean="0"/>
+              <a:t>work with BIG complicated structures</a:t>
+            </a:r>
+            <a:r>
+              <a:rPr lang="en-US" dirty="0" smtClean="0"/>
+              <a:t>?</a:t>
             </a:r>
             <a:endParaRPr lang="en-US" dirty="0"/>
           </a:p>
@@ -4438,11 +4446,7 @@
           <a:p>
             <a:r>
               <a:rPr lang="en-US" dirty="0" smtClean="0"/>
-              <a:t>Accessing values through method </a:t>
-            </a:r>
-            <a:r>
-              <a:rPr lang="en-US" dirty="0" smtClean="0"/>
-              <a:t>chaining</a:t>
+              <a:t>Accessing values through method chaining</a:t>
             </a:r>
           </a:p>
           <a:p>
@@ -4464,19 +4468,7 @@
           <a:p>
             <a:r>
               <a:rPr lang="en-US" dirty="0" smtClean="0"/>
-              <a:t>Dealing with ambiguity </a:t>
-            </a:r>
-            <a:r>
-              <a:rPr lang="en-US" dirty="0" smtClean="0"/>
-              <a:t>in </a:t>
-            </a:r>
-            <a:r>
-              <a:rPr lang="en-US" dirty="0" smtClean="0"/>
-              <a:t>complex </a:t>
-            </a:r>
-            <a:r>
-              <a:rPr lang="en-US" dirty="0" smtClean="0"/>
-              <a:t>structures</a:t>
+              <a:t>Dealing with ambiguity in complex structures</a:t>
             </a:r>
             <a:endParaRPr lang="en-US" dirty="0"/>
           </a:p>
@@ -8042,11 +8034,7 @@
           <a:p>
             <a:r>
               <a:rPr lang="en-US" dirty="0" smtClean="0"/>
-              <a:t>Big Data is a HUGE part of Web </a:t>
-            </a:r>
-            <a:r>
-              <a:rPr lang="en-US" dirty="0" smtClean="0"/>
-              <a:t>Development</a:t>
+              <a:t>Big Data is a HUGE part of Web Development</a:t>
             </a:r>
           </a:p>
           <a:p>
@@ -8065,23 +8053,14 @@
               <a:rPr lang="en-US" dirty="0" smtClean="0"/>
               <a:t>data</a:t>
             </a:r>
+          </a:p>
+          <a:p>
             <a:endParaRPr lang="en-US" dirty="0" smtClean="0"/>
           </a:p>
           <a:p>
-            <a:endParaRPr lang="en-US" dirty="0" smtClean="0"/>
-          </a:p>
-          <a:p>
-            <a:r>
-              <a:rPr lang="en-US" dirty="0" smtClean="0"/>
-              <a:t>Ability to navigate them easily is </a:t>
-            </a:r>
-            <a:r>
-              <a:rPr lang="en-US" dirty="0" smtClean="0"/>
-              <a:t>a crucial prerequisite of API </a:t>
-            </a:r>
-            <a:r>
-              <a:rPr lang="en-US" dirty="0" smtClean="0"/>
-              <a:t>integration</a:t>
+            <a:r>
+              <a:rPr lang="en-US" dirty="0" smtClean="0"/>
+              <a:t>Ability to navigate them easily is a crucial prerequisite of API integration</a:t>
             </a:r>
           </a:p>
           <a:p>
@@ -12041,7 +12020,6 @@
               <a:rPr lang="en-US" dirty="0" smtClean="0"/>
               <a:t>Refactor code for clarity </a:t>
             </a:r>
-            <a:endParaRPr lang="en-US" dirty="0" smtClean="0"/>
           </a:p>
           <a:p>
             <a:pPr marL="0" indent="0">
@@ -12615,19 +12593,11 @@
           <a:p>
             <a:r>
               <a:rPr lang="en-US" dirty="0" smtClean="0"/>
-              <a:t>Indexes </a:t>
-            </a:r>
-            <a:r>
-              <a:rPr lang="en-US" dirty="0" smtClean="0"/>
-              <a:t>are</a:t>
+              <a:t>Indexes are</a:t>
             </a:r>
             <a:r>
               <a:rPr lang="en-US" baseline="0" dirty="0" smtClean="0"/>
-              <a:t> </a:t>
-            </a:r>
-            <a:r>
-              <a:rPr lang="en-US" baseline="0" dirty="0" smtClean="0"/>
-              <a:t>poorly named variables</a:t>
+              <a:t> poorly named variables</a:t>
             </a:r>
           </a:p>
         </p:txBody>
@@ -16870,26 +16840,14 @@
           <a:p>
             <a:r>
               <a:rPr lang="en-US" dirty="0" smtClean="0"/>
-              <a:t>Optimal Solution </a:t>
-            </a:r>
-            <a:r>
-              <a:rPr lang="en-US" dirty="0" smtClean="0"/>
-              <a:t>Maybe </a:t>
+              <a:t>Optimal Solution Maybe </a:t>
             </a:r>
             <a:br>
               <a:rPr lang="en-US" dirty="0" smtClean="0"/>
             </a:br>
             <a:r>
               <a:rPr lang="en-US" dirty="0" smtClean="0"/>
-              <a:t>An</a:t>
-            </a:r>
-            <a:r>
-              <a:rPr lang="en-US" dirty="0" smtClean="0"/>
-              <a:t> </a:t>
-            </a:r>
-            <a:r>
-              <a:rPr lang="en-US" dirty="0" smtClean="0"/>
-              <a:t>Array of Hashes </a:t>
+              <a:t>An Array of Hashes </a:t>
             </a:r>
             <a:endParaRPr lang="en-US" dirty="0"/>
           </a:p>

</xml_diff>